<commit_message>
ressources pour le poster
</commit_message>
<xml_diff>
--- a/Poster_1.pptx
+++ b/Poster_1.pptx
@@ -243,7 +243,7 @@
           <a:p>
             <a:fld id="{A8490EA5-CA6F-8D4B-8D24-9E860C725A80}" type="datetimeFigureOut">
               <a:rPr lang="fr-FR" smtClean="0"/>
-              <a:t>28/01/2018</a:t>
+              <a:t>30/01/2018</a:t>
             </a:fld>
             <a:endParaRPr lang="fr-FR"/>
           </a:p>
@@ -408,7 +408,7 @@
           <a:p>
             <a:fld id="{A8490EA5-CA6F-8D4B-8D24-9E860C725A80}" type="datetimeFigureOut">
               <a:rPr lang="fr-FR" smtClean="0"/>
-              <a:t>28/01/2018</a:t>
+              <a:t>30/01/2018</a:t>
             </a:fld>
             <a:endParaRPr lang="fr-FR"/>
           </a:p>
@@ -583,7 +583,7 @@
           <a:p>
             <a:fld id="{A8490EA5-CA6F-8D4B-8D24-9E860C725A80}" type="datetimeFigureOut">
               <a:rPr lang="fr-FR" smtClean="0"/>
-              <a:t>28/01/2018</a:t>
+              <a:t>30/01/2018</a:t>
             </a:fld>
             <a:endParaRPr lang="fr-FR"/>
           </a:p>
@@ -748,7 +748,7 @@
           <a:p>
             <a:fld id="{A8490EA5-CA6F-8D4B-8D24-9E860C725A80}" type="datetimeFigureOut">
               <a:rPr lang="fr-FR" smtClean="0"/>
-              <a:t>28/01/2018</a:t>
+              <a:t>30/01/2018</a:t>
             </a:fld>
             <a:endParaRPr lang="fr-FR"/>
           </a:p>
@@ -987,7 +987,7 @@
           <a:p>
             <a:fld id="{A8490EA5-CA6F-8D4B-8D24-9E860C725A80}" type="datetimeFigureOut">
               <a:rPr lang="fr-FR" smtClean="0"/>
-              <a:t>28/01/2018</a:t>
+              <a:t>30/01/2018</a:t>
             </a:fld>
             <a:endParaRPr lang="fr-FR"/>
           </a:p>
@@ -1214,7 +1214,7 @@
           <a:p>
             <a:fld id="{A8490EA5-CA6F-8D4B-8D24-9E860C725A80}" type="datetimeFigureOut">
               <a:rPr lang="fr-FR" smtClean="0"/>
-              <a:t>28/01/2018</a:t>
+              <a:t>30/01/2018</a:t>
             </a:fld>
             <a:endParaRPr lang="fr-FR"/>
           </a:p>
@@ -1576,7 +1576,7 @@
           <a:p>
             <a:fld id="{A8490EA5-CA6F-8D4B-8D24-9E860C725A80}" type="datetimeFigureOut">
               <a:rPr lang="fr-FR" smtClean="0"/>
-              <a:t>28/01/2018</a:t>
+              <a:t>30/01/2018</a:t>
             </a:fld>
             <a:endParaRPr lang="fr-FR"/>
           </a:p>
@@ -1689,7 +1689,7 @@
           <a:p>
             <a:fld id="{A8490EA5-CA6F-8D4B-8D24-9E860C725A80}" type="datetimeFigureOut">
               <a:rPr lang="fr-FR" smtClean="0"/>
-              <a:t>28/01/2018</a:t>
+              <a:t>30/01/2018</a:t>
             </a:fld>
             <a:endParaRPr lang="fr-FR"/>
           </a:p>
@@ -1779,7 +1779,7 @@
           <a:p>
             <a:fld id="{A8490EA5-CA6F-8D4B-8D24-9E860C725A80}" type="datetimeFigureOut">
               <a:rPr lang="fr-FR" smtClean="0"/>
-              <a:t>28/01/2018</a:t>
+              <a:t>30/01/2018</a:t>
             </a:fld>
             <a:endParaRPr lang="fr-FR"/>
           </a:p>
@@ -2051,7 +2051,7 @@
           <a:p>
             <a:fld id="{A8490EA5-CA6F-8D4B-8D24-9E860C725A80}" type="datetimeFigureOut">
               <a:rPr lang="fr-FR" smtClean="0"/>
-              <a:t>28/01/2018</a:t>
+              <a:t>30/01/2018</a:t>
             </a:fld>
             <a:endParaRPr lang="fr-FR"/>
           </a:p>
@@ -2303,7 +2303,7 @@
           <a:p>
             <a:fld id="{A8490EA5-CA6F-8D4B-8D24-9E860C725A80}" type="datetimeFigureOut">
               <a:rPr lang="fr-FR" smtClean="0"/>
-              <a:t>28/01/2018</a:t>
+              <a:t>30/01/2018</a:t>
             </a:fld>
             <a:endParaRPr lang="fr-FR"/>
           </a:p>
@@ -2511,7 +2511,7 @@
           <a:p>
             <a:fld id="{A8490EA5-CA6F-8D4B-8D24-9E860C725A80}" type="datetimeFigureOut">
               <a:rPr lang="fr-FR" smtClean="0"/>
-              <a:t>28/01/2018</a:t>
+              <a:t>30/01/2018</a:t>
             </a:fld>
             <a:endParaRPr lang="fr-FR"/>
           </a:p>
@@ -2916,8 +2916,8 @@
           <a:chExt cx="0" cy="0"/>
         </a:xfrm>
       </p:grpSpPr>
-      <mc:AlternateContent xmlns:mc="http://schemas.openxmlformats.org/markup-compatibility/2006">
-        <mc:Choice xmlns:a14="http://schemas.microsoft.com/office/drawing/2010/main" Requires="a14">
+      <mc:AlternateContent xmlns:mc="http://schemas.openxmlformats.org/markup-compatibility/2006" xmlns:a14="http://schemas.microsoft.com/office/drawing/2010/main">
+        <mc:Choice Requires="a14">
           <p:sp>
             <p:nvSpPr>
               <p:cNvPr id="73" name="TextBox 72"/>
@@ -3384,7 +3384,7 @@
             </p:txBody>
           </p:sp>
         </mc:Choice>
-        <mc:Fallback>
+        <mc:Fallback xmlns="">
           <p:sp>
             <p:nvSpPr>
               <p:cNvPr id="73" name="TextBox 72"/>
@@ -3484,62 +3484,7 @@
                 <a:ea typeface="Arial" charset="0"/>
                 <a:cs typeface="Arial" charset="0"/>
               </a:rPr>
-              <a:t>Réalisé </a:t>
-            </a:r>
-            <a:r>
-              <a:rPr lang="fr-FR" sz="1600" b="1" dirty="0" smtClean="0">
-                <a:solidFill>
-                  <a:srgbClr val="38ADE3"/>
-                </a:solidFill>
-                <a:latin typeface="Arial" charset="0"/>
-                <a:ea typeface="Arial" charset="0"/>
-                <a:cs typeface="Arial" charset="0"/>
-              </a:rPr>
-              <a:t>Mathieu ROUX et </a:t>
-            </a:r>
-            <a:r>
-              <a:rPr lang="fr-FR" sz="1600" b="1" dirty="0" smtClean="0">
-                <a:solidFill>
-                  <a:srgbClr val="38ADE3"/>
-                </a:solidFill>
-                <a:latin typeface="Arial" charset="0"/>
-                <a:ea typeface="Arial" charset="0"/>
-                <a:cs typeface="Arial" charset="0"/>
-              </a:rPr>
-              <a:t>Théo </a:t>
-            </a:r>
-            <a:r>
-              <a:rPr lang="fr-FR" sz="1600" b="1" dirty="0" smtClean="0">
-                <a:solidFill>
-                  <a:srgbClr val="38ADE3"/>
-                </a:solidFill>
-                <a:latin typeface="Arial" charset="0"/>
-                <a:ea typeface="Arial" charset="0"/>
-                <a:cs typeface="Arial" charset="0"/>
-              </a:rPr>
-              <a:t>VIEL, sous </a:t>
-            </a:r>
-            <a:r>
-              <a:rPr lang="fr-FR" sz="1600" b="1" dirty="0" smtClean="0">
-                <a:solidFill>
-                  <a:srgbClr val="38ADE3"/>
-                </a:solidFill>
-                <a:latin typeface="Arial" charset="0"/>
-                <a:ea typeface="Arial" charset="0"/>
-                <a:cs typeface="Arial" charset="0"/>
-              </a:rPr>
-              <a:t>la direction de </a:t>
-            </a:r>
-            <a:r>
-              <a:rPr lang="fr-FR" sz="1600" b="1" dirty="0" smtClean="0">
-                <a:solidFill>
-                  <a:srgbClr val="38ADE3"/>
-                </a:solidFill>
-                <a:latin typeface="Arial" charset="0"/>
-                <a:ea typeface="Arial" charset="0"/>
-                <a:cs typeface="Arial" charset="0"/>
-              </a:rPr>
-              <a:t>Pierre-André ZITT.</a:t>
+              <a:t>Réalisé Mathieu ROUX et Théo VIEL, sous la direction de Pierre-André ZITT.</a:t>
             </a:r>
             <a:endParaRPr lang="fr-FR" sz="1600" b="1" dirty="0" smtClean="0">
               <a:solidFill>
@@ -3557,13 +3502,18 @@
         </p:nvSpPr>
         <p:spPr>
           <a:xfrm>
-            <a:off x="369400" y="1371047"/>
-            <a:ext cx="3253032" cy="3939540"/>
+            <a:off x="260511" y="1366920"/>
+            <a:ext cx="3253032" cy="4093428"/>
           </a:xfrm>
           <a:prstGeom prst="rect">
             <a:avLst/>
           </a:prstGeom>
           <a:noFill/>
+          <a:ln>
+            <a:solidFill>
+              <a:schemeClr val="tx1"/>
+            </a:solidFill>
+          </a:ln>
         </p:spPr>
         <p:txBody>
           <a:bodyPr wrap="square" rtlCol="0">
@@ -3654,21 +3604,7 @@
                 <a:latin typeface="Arial" panose="020B0604020202020204" pitchFamily="34" charset="0"/>
                 <a:cs typeface="Arial" panose="020B0604020202020204" pitchFamily="34" charset="0"/>
               </a:rPr>
-              <a:t>Le </a:t>
-            </a:r>
-            <a:r>
-              <a:rPr lang="fr-FR" sz="1000" dirty="0" smtClean="0">
-                <a:latin typeface="Arial" panose="020B0604020202020204" pitchFamily="34" charset="0"/>
-                <a:cs typeface="Arial" panose="020B0604020202020204" pitchFamily="34" charset="0"/>
-              </a:rPr>
-              <a:t>but de ce projet </a:t>
-            </a:r>
-            <a:r>
-              <a:rPr lang="fr-FR" sz="1000" dirty="0" smtClean="0">
-                <a:latin typeface="Arial" panose="020B0604020202020204" pitchFamily="34" charset="0"/>
-                <a:cs typeface="Arial" panose="020B0604020202020204" pitchFamily="34" charset="0"/>
-              </a:rPr>
-              <a:t>est de résoudre un puzzle spécifique, grâce à l’implémentation de deux algorithmes abordant le problème de façon différentes. La première méthode est probabiliste et la deuxième déterministe. Il est couplé avec le projet du cours de Développement Logiciel, que nous évoquerons plus succinctement.</a:t>
+              <a:t>Le but de ce projet est de résoudre un puzzle spécifique, grâce à l’implémentation de deux algorithmes abordant le problème de façon différentes. La première méthode est probabiliste et la deuxième déterministe. Il est couplé avec le projet du cours de Développement Logiciel, que nous évoquerons plus succinctement.</a:t>
             </a:r>
           </a:p>
           <a:p>
@@ -3685,14 +3621,7 @@
                 <a:latin typeface="Arial" panose="020B0604020202020204" pitchFamily="34" charset="0"/>
                 <a:cs typeface="Arial" panose="020B0604020202020204" pitchFamily="34" charset="0"/>
               </a:rPr>
-              <a:t>2- Cadre </a:t>
-            </a:r>
-            <a:r>
-              <a:rPr lang="fr-FR" sz="1100" b="1" u="sng" dirty="0" smtClean="0">
-                <a:latin typeface="Arial" panose="020B0604020202020204" pitchFamily="34" charset="0"/>
-                <a:cs typeface="Arial" panose="020B0604020202020204" pitchFamily="34" charset="0"/>
-              </a:rPr>
-              <a:t>d’étude, présentation du puzzle:</a:t>
+              <a:t>2- Cadre d’étude, présentation du puzzle:</a:t>
             </a:r>
           </a:p>
           <a:p>
@@ -3767,7 +3696,21 @@
                 <a:latin typeface="Arial" panose="020B0604020202020204" pitchFamily="34" charset="0"/>
                 <a:cs typeface="Arial" panose="020B0604020202020204" pitchFamily="34" charset="0"/>
               </a:rPr>
-              <a:t> et est représenté ci-dessous: </a:t>
+              <a:t> et est représenté </a:t>
+            </a:r>
+            <a:r>
+              <a:rPr lang="fr-FR" sz="1000" dirty="0" smtClean="0">
+                <a:latin typeface="Arial" panose="020B0604020202020204" pitchFamily="34" charset="0"/>
+                <a:cs typeface="Arial" panose="020B0604020202020204" pitchFamily="34" charset="0"/>
+              </a:rPr>
+              <a:t>ci-dessous</a:t>
+            </a:r>
+            <a:r>
+              <a:rPr lang="fr-FR" sz="1000" dirty="0" smtClean="0">
+                <a:latin typeface="Arial" panose="020B0604020202020204" pitchFamily="34" charset="0"/>
+                <a:cs typeface="Arial" panose="020B0604020202020204" pitchFamily="34" charset="0"/>
+              </a:rPr>
+              <a:t>. Nous avons généralisé à d’autres tailles.</a:t>
             </a:r>
             <a:endParaRPr lang="fr-FR" sz="1000" dirty="0" smtClean="0">
               <a:latin typeface="Arial" panose="020B0604020202020204" pitchFamily="34" charset="0"/>
@@ -3776,8 +3719,8 @@
           </a:p>
         </p:txBody>
       </p:sp>
-      <mc:AlternateContent xmlns:mc="http://schemas.openxmlformats.org/markup-compatibility/2006">
-        <mc:Choice xmlns:a14="http://schemas.microsoft.com/office/drawing/2010/main" Requires="a14">
+      <mc:AlternateContent xmlns:mc="http://schemas.openxmlformats.org/markup-compatibility/2006" xmlns:a14="http://schemas.microsoft.com/office/drawing/2010/main">
+        <mc:Choice Requires="a14">
           <p:sp>
             <p:nvSpPr>
               <p:cNvPr id="27" name="TextBox 19"/>
@@ -4172,7 +4115,7 @@
             </p:txBody>
           </p:sp>
         </mc:Choice>
-        <mc:Fallback>
+        <mc:Fallback xmlns="">
           <p:sp>
             <p:nvSpPr>
               <p:cNvPr id="27" name="TextBox 19"/>
@@ -4626,8 +4569,8 @@
           </a:p>
         </p:txBody>
       </p:sp>
-      <mc:AlternateContent xmlns:mc="http://schemas.openxmlformats.org/markup-compatibility/2006">
-        <mc:Choice xmlns:a14="http://schemas.microsoft.com/office/drawing/2010/main" Requires="a14">
+      <mc:AlternateContent xmlns:mc="http://schemas.openxmlformats.org/markup-compatibility/2006" xmlns:a14="http://schemas.microsoft.com/office/drawing/2010/main">
+        <mc:Choice Requires="a14">
           <p:sp>
             <p:nvSpPr>
               <p:cNvPr id="57" name="TextBox 56"/>
@@ -4727,7 +4670,7 @@
             </p:txBody>
           </p:sp>
         </mc:Choice>
-        <mc:Fallback>
+        <mc:Fallback xmlns="">
           <p:sp>
             <p:nvSpPr>
               <p:cNvPr id="57" name="TextBox 56"/>
@@ -4812,8 +4755,8 @@
           </a:p>
         </p:txBody>
       </p:sp>
-      <mc:AlternateContent xmlns:mc="http://schemas.openxmlformats.org/markup-compatibility/2006">
-        <mc:Choice xmlns:a14="http://schemas.microsoft.com/office/drawing/2010/main" Requires="a14">
+      <mc:AlternateContent xmlns:mc="http://schemas.openxmlformats.org/markup-compatibility/2006" xmlns:a14="http://schemas.microsoft.com/office/drawing/2010/main">
+        <mc:Choice Requires="a14">
           <p:sp>
             <p:nvSpPr>
               <p:cNvPr id="62" name="TextBox 61"/>
@@ -5210,7 +5153,7 @@
                     <m:d>
                       <m:dPr>
                         <m:ctrlPr>
-                          <a:rPr lang="fr-FR" sz="1000" b="0" i="0" smtClean="0">
+                          <a:rPr lang="fr-FR" sz="1000" b="0" i="1" smtClean="0">
                             <a:solidFill>
                               <a:prstClr val="black"/>
                             </a:solidFill>
@@ -5255,7 +5198,7 @@
             </p:txBody>
           </p:sp>
         </mc:Choice>
-        <mc:Fallback>
+        <mc:Fallback xmlns="">
           <p:sp>
             <p:nvSpPr>
               <p:cNvPr id="62" name="TextBox 61"/>
@@ -5294,8 +5237,8 @@
           </p:sp>
         </mc:Fallback>
       </mc:AlternateContent>
-      <mc:AlternateContent xmlns:mc="http://schemas.openxmlformats.org/markup-compatibility/2006">
-        <mc:Choice xmlns:a14="http://schemas.microsoft.com/office/drawing/2010/main" Requires="a14">
+      <mc:AlternateContent xmlns:mc="http://schemas.openxmlformats.org/markup-compatibility/2006" xmlns:a14="http://schemas.microsoft.com/office/drawing/2010/main">
+        <mc:Choice Requires="a14">
           <p:sp>
             <p:nvSpPr>
               <p:cNvPr id="72" name="TextBox 71"/>
@@ -5318,7 +5261,6 @@
               </a:bodyPr>
               <a:lstStyle/>
               <a:p>
-                <a:pPr/>
                 <a14:m>
                   <m:oMath xmlns:m="http://schemas.openxmlformats.org/officeDocument/2006/math">
                     <m:r>
@@ -5474,7 +5416,7 @@
             </p:txBody>
           </p:sp>
         </mc:Choice>
-        <mc:Fallback>
+        <mc:Fallback xmlns="">
           <p:sp>
             <p:nvSpPr>
               <p:cNvPr id="72" name="TextBox 71"/>
@@ -5524,12 +5466,17 @@
             <p:spPr>
               <a:xfrm>
                 <a:off x="3721053" y="1367656"/>
-                <a:ext cx="3249706" cy="10941457"/>
+                <a:ext cx="3249706" cy="11141512"/>
               </a:xfrm>
               <a:prstGeom prst="rect">
                 <a:avLst/>
               </a:prstGeom>
               <a:noFill/>
+              <a:ln>
+                <a:solidFill>
+                  <a:schemeClr val="tx1"/>
+                </a:solidFill>
+              </a:ln>
             </p:spPr>
             <p:txBody>
               <a:bodyPr wrap="square" rtlCol="0">
@@ -5917,7 +5864,7 @@
               </a:p>
               <a:p>
                 <a:pPr lvl="0" algn="just"/>
-                <a:endParaRPr lang="fr-FR" sz="1000" dirty="0">
+                <a:endParaRPr lang="fr-FR" sz="700" dirty="0">
                   <a:solidFill>
                     <a:prstClr val="black"/>
                   </a:solidFill>
@@ -5935,7 +5882,89 @@
                     <a:latin typeface="Arial" panose="020B0604020202020204" pitchFamily="34" charset="0"/>
                     <a:cs typeface="Arial" panose="020B0604020202020204" pitchFamily="34" charset="0"/>
                   </a:rPr>
-                  <a:t>Et nous avons optimisé les paramètres pour le problème 5x5, en regardant sur 30 exécutions le nombre moyen d’itérations nécessaires.</a:t>
+                  <a:t>Et nous avons optimisé les paramètres pour le problème 5x5, en regardant sur 30 exécutions le nombre moyen d’itérations </a:t>
+                </a:r>
+                <a:r>
+                  <a:rPr lang="fr-FR" sz="1000" dirty="0" smtClean="0">
+                    <a:solidFill>
+                      <a:prstClr val="black"/>
+                    </a:solidFill>
+                    <a:latin typeface="Arial" panose="020B0604020202020204" pitchFamily="34" charset="0"/>
+                    <a:cs typeface="Arial" panose="020B0604020202020204" pitchFamily="34" charset="0"/>
+                  </a:rPr>
+                  <a:t>nécessaires pour trouver une solution. Il s’est avéré qu</a:t>
+                </a:r>
+                <a:r>
+                  <a:rPr lang="fr-FR" sz="1000" dirty="0" smtClean="0">
+                    <a:solidFill>
+                      <a:prstClr val="black"/>
+                    </a:solidFill>
+                    <a:latin typeface="Arial" panose="020B0604020202020204" pitchFamily="34" charset="0"/>
+                    <a:cs typeface="Arial" panose="020B0604020202020204" pitchFamily="34" charset="0"/>
+                  </a:rPr>
+                  <a:t>e le choix </a:t>
+                </a:r>
+                <a14:m>
+                  <m:oMath xmlns:m="http://schemas.openxmlformats.org/officeDocument/2006/math">
+                    <m:r>
+                      <a:rPr lang="fr-FR" sz="1000" i="1">
+                        <a:latin typeface="Cambria Math" panose="02040503050406030204" pitchFamily="18" charset="0"/>
+                        <a:ea typeface="Cambria Math" panose="02040503050406030204" pitchFamily="18" charset="0"/>
+                      </a:rPr>
+                      <m:t>𝑎</m:t>
+                    </m:r>
+                    <m:r>
+                      <a:rPr lang="fr-FR" sz="1000" b="0" i="1" smtClean="0">
+                        <a:latin typeface="Cambria Math" panose="02040503050406030204" pitchFamily="18" charset="0"/>
+                        <a:ea typeface="Cambria Math" panose="02040503050406030204" pitchFamily="18" charset="0"/>
+                      </a:rPr>
+                      <m:t>=0.1</m:t>
+                    </m:r>
+                  </m:oMath>
+                </a14:m>
+                <a:r>
+                  <a:rPr lang="fr-FR" sz="1000" dirty="0" smtClean="0">
+                    <a:solidFill>
+                      <a:prstClr val="black"/>
+                    </a:solidFill>
+                    <a:latin typeface="Arial" panose="020B0604020202020204" pitchFamily="34" charset="0"/>
+                    <a:cs typeface="Arial" panose="020B0604020202020204" pitchFamily="34" charset="0"/>
+                  </a:rPr>
+                  <a:t> et </a:t>
+                </a:r>
+                <a14:m>
+                  <m:oMath xmlns:m="http://schemas.openxmlformats.org/officeDocument/2006/math">
+                    <m:r>
+                      <a:rPr lang="fr-FR" sz="1000" b="0" i="1" smtClean="0">
+                        <a:solidFill>
+                          <a:prstClr val="black"/>
+                        </a:solidFill>
+                        <a:latin typeface="Cambria Math" panose="02040503050406030204" pitchFamily="18" charset="0"/>
+                        <a:cs typeface="Arial" panose="020B0604020202020204" pitchFamily="34" charset="0"/>
+                      </a:rPr>
+                      <m:t>𝑏</m:t>
+                    </m:r>
+                    <m:r>
+                      <a:rPr lang="fr-FR" sz="1000" b="0" i="1" smtClean="0">
+                        <a:solidFill>
+                          <a:prstClr val="black"/>
+                        </a:solidFill>
+                        <a:latin typeface="Cambria Math" panose="02040503050406030204" pitchFamily="18" charset="0"/>
+                        <a:cs typeface="Arial" panose="020B0604020202020204" pitchFamily="34" charset="0"/>
+                      </a:rPr>
+                      <m:t>=0.9</m:t>
+                    </m:r>
+                  </m:oMath>
+                </a14:m>
+                <a:r>
+                  <a:rPr lang="fr-FR" sz="1000" dirty="0" smtClean="0">
+                    <a:solidFill>
+                      <a:prstClr val="black"/>
+                    </a:solidFill>
+                    <a:latin typeface="Arial" panose="020B0604020202020204" pitchFamily="34" charset="0"/>
+                    <a:cs typeface="Arial" panose="020B0604020202020204" pitchFamily="34" charset="0"/>
+                  </a:rPr>
+                  <a:t> était le plus performant.</a:t>
                 </a:r>
                 <a:endParaRPr lang="fr-FR" sz="1000" dirty="0">
                   <a:solidFill>
@@ -6037,16 +6066,6 @@
               </a:p>
               <a:p>
                 <a:pPr lvl="0" algn="just"/>
-                <a:endParaRPr lang="fr-FR" sz="1000" b="1" dirty="0" smtClean="0">
-                  <a:solidFill>
-                    <a:prstClr val="black"/>
-                  </a:solidFill>
-                  <a:latin typeface="Arial" panose="020B0604020202020204" pitchFamily="34" charset="0"/>
-                  <a:cs typeface="Arial" panose="020B0604020202020204" pitchFamily="34" charset="0"/>
-                </a:endParaRPr>
-              </a:p>
-              <a:p>
-                <a:pPr lvl="0" algn="just"/>
                 <a:endParaRPr lang="fr-FR" sz="1000" b="1" dirty="0">
                   <a:solidFill>
                     <a:prstClr val="black"/>
@@ -6057,7 +6076,17 @@
               </a:p>
               <a:p>
                 <a:pPr lvl="0" algn="just"/>
-                <a:endParaRPr lang="fr-FR" sz="1000" b="1" dirty="0" smtClean="0">
+                <a:endParaRPr lang="fr-FR" sz="900" b="1" dirty="0">
+                  <a:solidFill>
+                    <a:prstClr val="black"/>
+                  </a:solidFill>
+                  <a:latin typeface="Arial" panose="020B0604020202020204" pitchFamily="34" charset="0"/>
+                  <a:cs typeface="Arial" panose="020B0604020202020204" pitchFamily="34" charset="0"/>
+                </a:endParaRPr>
+              </a:p>
+              <a:p>
+                <a:pPr lvl="0" algn="just"/>
+                <a:endParaRPr lang="fr-FR" sz="700" b="1" dirty="0" smtClean="0">
                   <a:solidFill>
                     <a:prstClr val="black"/>
                   </a:solidFill>
@@ -6115,7 +6144,27 @@
                     <a:latin typeface="Arial" panose="020B0604020202020204" pitchFamily="34" charset="0"/>
                     <a:cs typeface="Arial" panose="020B0604020202020204" pitchFamily="34" charset="0"/>
                   </a:rPr>
-                  <a:t>, un puzzle 5x5 à 6 pièces de géométrie non triviale est résolu en 15 000 itérations en moyenne. Ce qui est satisfaisant puisqu’il y a plus d’un milliard de possibilités.</a:t>
+                  <a:t>, un puzzle 5x5 à 6 pièces de géométrie non triviale est résolu en </a:t>
+                </a:r>
+                <a:r>
+                  <a:rPr lang="fr-FR" sz="1000" dirty="0" smtClean="0">
+                    <a:solidFill>
+                      <a:prstClr val="black"/>
+                    </a:solidFill>
+                    <a:latin typeface="Arial" panose="020B0604020202020204" pitchFamily="34" charset="0"/>
+                    <a:cs typeface="Arial" panose="020B0604020202020204" pitchFamily="34" charset="0"/>
+                  </a:rPr>
+                  <a:t>13 500 </a:t>
+                </a:r>
+                <a:r>
+                  <a:rPr lang="fr-FR" sz="1000" dirty="0" smtClean="0">
+                    <a:solidFill>
+                      <a:prstClr val="black"/>
+                    </a:solidFill>
+                    <a:latin typeface="Arial" panose="020B0604020202020204" pitchFamily="34" charset="0"/>
+                    <a:cs typeface="Arial" panose="020B0604020202020204" pitchFamily="34" charset="0"/>
+                  </a:rPr>
+                  <a:t>itérations en moyenne. Ce qui est satisfaisant puisqu’il y a plus d’un milliard de possibilités.</a:t>
                 </a:r>
                 <a:endParaRPr lang="fr-FR" sz="1000" dirty="0">
                   <a:solidFill>
@@ -6263,7 +6312,7 @@
             <p:spPr>
               <a:xfrm>
                 <a:off x="3721053" y="1367656"/>
-                <a:ext cx="3249706" cy="10941457"/>
+                <a:ext cx="3249706" cy="11141512"/>
               </a:xfrm>
               <a:prstGeom prst="rect">
                 <a:avLst/>
@@ -6271,9 +6320,14 @@
               <a:blipFill rotWithShape="0">
                 <a:blip r:embed="rId9"/>
                 <a:stretch>
-                  <a:fillRect t="-56"/>
+                  <a:fillRect/>
                 </a:stretch>
               </a:blipFill>
+              <a:ln>
+                <a:solidFill>
+                  <a:schemeClr val="tx1"/>
+                </a:solidFill>
+              </a:ln>
             </p:spPr>
             <p:txBody>
               <a:bodyPr/>
@@ -6290,8 +6344,8 @@
           </p:sp>
         </mc:Fallback>
       </mc:AlternateContent>
-      <mc:AlternateContent xmlns:mc="http://schemas.openxmlformats.org/markup-compatibility/2006">
-        <mc:Choice xmlns:a14="http://schemas.microsoft.com/office/drawing/2010/main" Requires="a14">
+      <mc:AlternateContent xmlns:mc="http://schemas.openxmlformats.org/markup-compatibility/2006" xmlns:a14="http://schemas.microsoft.com/office/drawing/2010/main">
+        <mc:Choice Requires="a14">
           <p:sp>
             <p:nvSpPr>
               <p:cNvPr id="77" name="TextBox 76"/>
@@ -6397,7 +6451,7 @@
             </p:txBody>
           </p:sp>
         </mc:Choice>
-        <mc:Fallback>
+        <mc:Fallback xmlns="">
           <p:sp>
             <p:nvSpPr>
               <p:cNvPr id="77" name="TextBox 76"/>
@@ -6458,7 +6512,7 @@
         </p:blipFill>
         <p:spPr>
           <a:xfrm>
-            <a:off x="3838131" y="2042378"/>
+            <a:off x="3838131" y="2032852"/>
             <a:ext cx="3015549" cy="1719831"/>
           </a:xfrm>
           <a:prstGeom prst="rect">
@@ -6518,7 +6572,7 @@
         </p:blipFill>
         <p:spPr>
           <a:xfrm>
-            <a:off x="3960394" y="7834315"/>
+            <a:off x="3960394" y="8096253"/>
             <a:ext cx="2771021" cy="1592580"/>
           </a:xfrm>
           <a:prstGeom prst="rect">
@@ -6539,7 +6593,7 @@
         </p:nvSpPr>
         <p:spPr>
           <a:xfrm>
-            <a:off x="3943145" y="9175880"/>
+            <a:off x="3943145" y="9437818"/>
             <a:ext cx="2866476" cy="246221"/>
           </a:xfrm>
           <a:prstGeom prst="rect">
@@ -6559,6 +6613,277 @@
               <a:t>Heuristique d’optimisation des paramètres a et b</a:t>
             </a:r>
             <a:endParaRPr lang="fr-FR" sz="1000" i="1" dirty="0"/>
+          </a:p>
+        </p:txBody>
+      </p:sp>
+      <p:sp>
+        <p:nvSpPr>
+          <p:cNvPr id="28" name="ZoneTexte 18"/>
+          <p:cNvSpPr txBox="1"/>
+          <p:nvPr/>
+        </p:nvSpPr>
+        <p:spPr>
+          <a:xfrm>
+            <a:off x="7192558" y="6205004"/>
+            <a:ext cx="3253032" cy="3693319"/>
+          </a:xfrm>
+          <a:prstGeom prst="rect">
+            <a:avLst/>
+          </a:prstGeom>
+          <a:noFill/>
+          <a:ln>
+            <a:solidFill>
+              <a:schemeClr val="tx1"/>
+            </a:solidFill>
+          </a:ln>
+        </p:spPr>
+        <p:txBody>
+          <a:bodyPr wrap="square" rtlCol="0">
+            <a:spAutoFit/>
+          </a:bodyPr>
+          <a:lstStyle/>
+          <a:p>
+            <a:pPr algn="just"/>
+            <a:r>
+              <a:rPr lang="fr-FR" sz="1100" b="1" dirty="0" smtClean="0">
+                <a:uFill>
+                  <a:solidFill>
+                    <a:srgbClr val="FF0000"/>
+                  </a:solidFill>
+                </a:uFill>
+                <a:latin typeface="Arial" panose="020B0604020202020204" pitchFamily="34" charset="0"/>
+                <a:cs typeface="Arial" panose="020B0604020202020204" pitchFamily="34" charset="0"/>
+              </a:rPr>
+              <a:t>    </a:t>
+            </a:r>
+            <a:r>
+              <a:rPr lang="fr-FR" sz="1200" b="1" u="sng" dirty="0" smtClean="0">
+                <a:uFill>
+                  <a:solidFill>
+                    <a:srgbClr val="FF0000"/>
+                  </a:solidFill>
+                </a:uFill>
+                <a:latin typeface="Arial" panose="020B0604020202020204" pitchFamily="34" charset="0"/>
+                <a:cs typeface="Arial" panose="020B0604020202020204" pitchFamily="34" charset="0"/>
+              </a:rPr>
+              <a:t>III – Méthode déterministe</a:t>
+            </a:r>
+          </a:p>
+          <a:p>
+            <a:pPr algn="just"/>
+            <a:endParaRPr lang="fr-FR" sz="700" b="1" u="sng" dirty="0" smtClean="0">
+              <a:latin typeface="Arial" panose="020B0604020202020204" pitchFamily="34" charset="0"/>
+              <a:cs typeface="Arial" panose="020B0604020202020204" pitchFamily="34" charset="0"/>
+            </a:endParaRPr>
+          </a:p>
+          <a:p>
+            <a:pPr algn="just"/>
+            <a:r>
+              <a:rPr lang="fr-FR" sz="1100" b="1" u="sng" dirty="0" smtClean="0">
+                <a:latin typeface="Arial" panose="020B0604020202020204" pitchFamily="34" charset="0"/>
+                <a:cs typeface="Arial" panose="020B0604020202020204" pitchFamily="34" charset="0"/>
+              </a:rPr>
+              <a:t>1- Objectif :</a:t>
+            </a:r>
+          </a:p>
+          <a:p>
+            <a:pPr algn="just"/>
+            <a:r>
+              <a:rPr lang="fr-FR" sz="500" b="1" u="sng" dirty="0" smtClean="0">
+                <a:latin typeface="Arial" panose="020B0604020202020204" pitchFamily="34" charset="0"/>
+                <a:cs typeface="Arial" panose="020B0604020202020204" pitchFamily="34" charset="0"/>
+              </a:rPr>
+              <a:t> </a:t>
+            </a:r>
+            <a:endParaRPr lang="fr-FR" sz="400" b="1" u="sng" dirty="0" smtClean="0">
+              <a:latin typeface="Arial" panose="020B0604020202020204" pitchFamily="34" charset="0"/>
+              <a:cs typeface="Arial" panose="020B0604020202020204" pitchFamily="34" charset="0"/>
+            </a:endParaRPr>
+          </a:p>
+          <a:p>
+            <a:pPr algn="just"/>
+            <a:r>
+              <a:rPr lang="fr-FR" sz="900" dirty="0" smtClean="0">
+                <a:latin typeface="Arial" panose="020B0604020202020204" pitchFamily="34" charset="0"/>
+                <a:cs typeface="Arial" panose="020B0604020202020204" pitchFamily="34" charset="0"/>
+              </a:rPr>
+              <a:t>    </a:t>
+            </a:r>
+            <a:r>
+              <a:rPr lang="fr-FR" sz="1000" dirty="0" smtClean="0">
+                <a:latin typeface="Arial" panose="020B0604020202020204" pitchFamily="34" charset="0"/>
+                <a:cs typeface="Arial" panose="020B0604020202020204" pitchFamily="34" charset="0"/>
+              </a:rPr>
+              <a:t>Le but de ce projet est de résoudre un puzzle spécifique, grâce à l’implémentation de deux algorithmes abordant le problème de façon différentes. La première méthode est probabiliste et la deuxième déterministe. Il est couplé avec le projet du cours de Développement Logiciel, que nous évoquerons plus succinctement.</a:t>
+            </a:r>
+          </a:p>
+          <a:p>
+            <a:pPr algn="just"/>
+            <a:endParaRPr lang="fr-FR" sz="1000" dirty="0">
+              <a:latin typeface="Arial" panose="020B0604020202020204" pitchFamily="34" charset="0"/>
+              <a:cs typeface="Arial" panose="020B0604020202020204" pitchFamily="34" charset="0"/>
+            </a:endParaRPr>
+          </a:p>
+          <a:p>
+            <a:pPr algn="just"/>
+            <a:endParaRPr lang="fr-FR" sz="1000" dirty="0" smtClean="0">
+              <a:latin typeface="Arial" panose="020B0604020202020204" pitchFamily="34" charset="0"/>
+              <a:cs typeface="Arial" panose="020B0604020202020204" pitchFamily="34" charset="0"/>
+            </a:endParaRPr>
+          </a:p>
+          <a:p>
+            <a:pPr algn="just"/>
+            <a:endParaRPr lang="fr-FR" sz="1000" dirty="0" smtClean="0">
+              <a:latin typeface="Arial" panose="020B0604020202020204" pitchFamily="34" charset="0"/>
+              <a:cs typeface="Arial" panose="020B0604020202020204" pitchFamily="34" charset="0"/>
+            </a:endParaRPr>
+          </a:p>
+          <a:p>
+            <a:pPr algn="just"/>
+            <a:r>
+              <a:rPr lang="fr-FR" sz="1100" b="1" dirty="0" smtClean="0">
+                <a:uFill>
+                  <a:solidFill>
+                    <a:srgbClr val="FF0000"/>
+                  </a:solidFill>
+                </a:uFill>
+                <a:latin typeface="Arial" panose="020B0604020202020204" pitchFamily="34" charset="0"/>
+                <a:cs typeface="Arial" panose="020B0604020202020204" pitchFamily="34" charset="0"/>
+              </a:rPr>
+              <a:t>    </a:t>
+            </a:r>
+            <a:r>
+              <a:rPr lang="fr-FR" sz="1100" b="1" u="sng" dirty="0" smtClean="0">
+                <a:uFill>
+                  <a:solidFill>
+                    <a:srgbClr val="FF0000"/>
+                  </a:solidFill>
+                </a:uFill>
+                <a:latin typeface="Arial" panose="020B0604020202020204" pitchFamily="34" charset="0"/>
+                <a:cs typeface="Arial" panose="020B0604020202020204" pitchFamily="34" charset="0"/>
+              </a:rPr>
+              <a:t>IV </a:t>
+            </a:r>
+            <a:r>
+              <a:rPr lang="fr-FR" sz="1100" b="1" u="sng" dirty="0">
+                <a:uFill>
+                  <a:solidFill>
+                    <a:srgbClr val="FF0000"/>
+                  </a:solidFill>
+                </a:uFill>
+                <a:latin typeface="Arial" panose="020B0604020202020204" pitchFamily="34" charset="0"/>
+                <a:cs typeface="Arial" panose="020B0604020202020204" pitchFamily="34" charset="0"/>
+              </a:rPr>
+              <a:t>– </a:t>
+            </a:r>
+            <a:r>
+              <a:rPr lang="fr-FR" sz="1100" b="1" u="sng" dirty="0" smtClean="0">
+                <a:uFill>
+                  <a:solidFill>
+                    <a:srgbClr val="FF0000"/>
+                  </a:solidFill>
+                </a:uFill>
+                <a:latin typeface="Arial" panose="020B0604020202020204" pitchFamily="34" charset="0"/>
+                <a:cs typeface="Arial" panose="020B0604020202020204" pitchFamily="34" charset="0"/>
+              </a:rPr>
+              <a:t>Bibliographie</a:t>
+            </a:r>
+          </a:p>
+          <a:p>
+            <a:pPr algn="just"/>
+            <a:endParaRPr lang="fr-FR" sz="1100" b="1" u="sng" dirty="0">
+              <a:uFill>
+                <a:solidFill>
+                  <a:srgbClr val="FF0000"/>
+                </a:solidFill>
+              </a:uFill>
+              <a:latin typeface="Arial" panose="020B0604020202020204" pitchFamily="34" charset="0"/>
+              <a:cs typeface="Arial" panose="020B0604020202020204" pitchFamily="34" charset="0"/>
+            </a:endParaRPr>
+          </a:p>
+          <a:p>
+            <a:pPr algn="just"/>
+            <a:endParaRPr lang="fr-FR" sz="1100" b="1" u="sng" dirty="0" smtClean="0">
+              <a:uFill>
+                <a:solidFill>
+                  <a:srgbClr val="FF0000"/>
+                </a:solidFill>
+              </a:uFill>
+              <a:latin typeface="Arial" panose="020B0604020202020204" pitchFamily="34" charset="0"/>
+              <a:cs typeface="Arial" panose="020B0604020202020204" pitchFamily="34" charset="0"/>
+            </a:endParaRPr>
+          </a:p>
+          <a:p>
+            <a:pPr algn="just"/>
+            <a:endParaRPr lang="fr-FR" sz="1100" b="1" u="sng" dirty="0">
+              <a:uFill>
+                <a:solidFill>
+                  <a:srgbClr val="FF0000"/>
+                </a:solidFill>
+              </a:uFill>
+              <a:latin typeface="Arial" panose="020B0604020202020204" pitchFamily="34" charset="0"/>
+              <a:cs typeface="Arial" panose="020B0604020202020204" pitchFamily="34" charset="0"/>
+            </a:endParaRPr>
+          </a:p>
+          <a:p>
+            <a:pPr algn="just"/>
+            <a:endParaRPr lang="fr-FR" sz="1100" b="1" u="sng" dirty="0" smtClean="0">
+              <a:uFill>
+                <a:solidFill>
+                  <a:srgbClr val="FF0000"/>
+                </a:solidFill>
+              </a:uFill>
+              <a:latin typeface="Arial" panose="020B0604020202020204" pitchFamily="34" charset="0"/>
+              <a:cs typeface="Arial" panose="020B0604020202020204" pitchFamily="34" charset="0"/>
+            </a:endParaRPr>
+          </a:p>
+          <a:p>
+            <a:pPr algn="just"/>
+            <a:endParaRPr lang="fr-FR" sz="1100" b="1" u="sng" dirty="0">
+              <a:uFill>
+                <a:solidFill>
+                  <a:srgbClr val="FF0000"/>
+                </a:solidFill>
+              </a:uFill>
+              <a:latin typeface="Arial" panose="020B0604020202020204" pitchFamily="34" charset="0"/>
+              <a:cs typeface="Arial" panose="020B0604020202020204" pitchFamily="34" charset="0"/>
+            </a:endParaRPr>
+          </a:p>
+          <a:p>
+            <a:pPr algn="just"/>
+            <a:endParaRPr lang="fr-FR" sz="1100" b="1" u="sng" dirty="0" smtClean="0">
+              <a:uFill>
+                <a:solidFill>
+                  <a:srgbClr val="FF0000"/>
+                </a:solidFill>
+              </a:uFill>
+              <a:latin typeface="Arial" panose="020B0604020202020204" pitchFamily="34" charset="0"/>
+              <a:cs typeface="Arial" panose="020B0604020202020204" pitchFamily="34" charset="0"/>
+            </a:endParaRPr>
+          </a:p>
+          <a:p>
+            <a:pPr algn="just"/>
+            <a:endParaRPr lang="fr-FR" sz="1100" b="1" u="sng" dirty="0">
+              <a:uFill>
+                <a:solidFill>
+                  <a:srgbClr val="FF0000"/>
+                </a:solidFill>
+              </a:uFill>
+              <a:latin typeface="Arial" panose="020B0604020202020204" pitchFamily="34" charset="0"/>
+              <a:cs typeface="Arial" panose="020B0604020202020204" pitchFamily="34" charset="0"/>
+            </a:endParaRPr>
+          </a:p>
+          <a:p>
+            <a:pPr algn="just"/>
+            <a:endParaRPr lang="fr-FR" sz="1100" b="1" u="sng" dirty="0">
+              <a:uFill>
+                <a:solidFill>
+                  <a:srgbClr val="FF0000"/>
+                </a:solidFill>
+              </a:uFill>
+              <a:latin typeface="Arial" panose="020B0604020202020204" pitchFamily="34" charset="0"/>
+              <a:cs typeface="Arial" panose="020B0604020202020204" pitchFamily="34" charset="0"/>
+            </a:endParaRPr>
           </a:p>
         </p:txBody>
       </p:sp>

</xml_diff>

<commit_message>
Principalement le poster TDlog
</commit_message>
<xml_diff>
--- a/Poster_1.pptx
+++ b/Poster_1.pptx
@@ -117,9 +117,9 @@
 </file>
 
 <file path=ppt/charts/chart1.xml><?xml version="1.0" encoding="utf-8"?>
-<c:chartSpace xmlns:c="http://schemas.openxmlformats.org/drawingml/2006/chart" xmlns:a="http://schemas.openxmlformats.org/drawingml/2006/main" xmlns:r="http://schemas.openxmlformats.org/officeDocument/2006/relationships" xmlns:c16r2="http://schemas.microsoft.com/office/drawing/2015/06/chart">
+<c:chartSpace xmlns:c="http://schemas.openxmlformats.org/drawingml/2006/chart" xmlns:a="http://schemas.openxmlformats.org/drawingml/2006/main" xmlns:r="http://schemas.openxmlformats.org/officeDocument/2006/relationships">
   <c:date1904 val="0"/>
-  <c:lang val="fr-FR"/>
+  <c:lang val="en-US"/>
   <c:roundedCorners val="0"/>
   <mc:AlternateContent xmlns:mc="http://schemas.openxmlformats.org/markup-compatibility/2006">
     <mc:Choice xmlns:c14="http://schemas.microsoft.com/office/drawing/2007/8/2/chart" Requires="c14">
@@ -237,7 +237,7 @@
             </c:numRef>
           </c:val>
           <c:smooth val="0"/>
-          <c:extLst>
+          <c:extLst xmlns:c16r2="http://schemas.microsoft.com/office/drawing/2015/06/chart">
             <c:ext xmlns:c16="http://schemas.microsoft.com/office/drawing/2014/chart" uri="{C3380CC4-5D6E-409C-BE32-E72D297353CC}">
               <c16:uniqueId val="{00000000-A35B-4B5B-B4F6-EBC780F9EB1F}"/>
             </c:ext>
@@ -334,7 +334,7 @@
             </c:numRef>
           </c:val>
           <c:smooth val="0"/>
-          <c:extLst>
+          <c:extLst xmlns:c16r2="http://schemas.microsoft.com/office/drawing/2015/06/chart">
             <c:ext xmlns:c16="http://schemas.microsoft.com/office/drawing/2014/chart" uri="{C3380CC4-5D6E-409C-BE32-E72D297353CC}">
               <c16:uniqueId val="{00000001-A35B-4B5B-B4F6-EBC780F9EB1F}"/>
             </c:ext>
@@ -350,11 +350,11 @@
         </c:dLbls>
         <c:marker val="1"/>
         <c:smooth val="0"/>
-        <c:axId val="278148704"/>
-        <c:axId val="278149248"/>
+        <c:axId val="198344256"/>
+        <c:axId val="198344800"/>
       </c:lineChart>
       <c:catAx>
-        <c:axId val="278148704"/>
+        <c:axId val="198344256"/>
         <c:scaling>
           <c:orientation val="minMax"/>
         </c:scaling>
@@ -460,7 +460,7 @@
             <a:endParaRPr lang="fr-FR"/>
           </a:p>
         </c:txPr>
-        <c:crossAx val="278149248"/>
+        <c:crossAx val="198344800"/>
         <c:crosses val="autoZero"/>
         <c:auto val="1"/>
         <c:lblAlgn val="ctr"/>
@@ -468,7 +468,7 @@
         <c:noMultiLvlLbl val="0"/>
       </c:catAx>
       <c:valAx>
-        <c:axId val="278149248"/>
+        <c:axId val="198344800"/>
         <c:scaling>
           <c:orientation val="minMax"/>
         </c:scaling>
@@ -595,7 +595,7 @@
             <a:endParaRPr lang="fr-FR"/>
           </a:p>
         </c:txPr>
-        <c:crossAx val="278148704"/>
+        <c:crossAx val="198344256"/>
         <c:crosses val="autoZero"/>
         <c:crossBetween val="between"/>
         <c:majorUnit val="10000"/>
@@ -651,14 +651,14 @@
     </c:legend>
     <c:plotVisOnly val="1"/>
     <c:dispBlanksAs val="zero"/>
-    <c:extLst>
+    <c:showDLblsOverMax val="0"/>
+    <c:extLst xmlns:c16r2="http://schemas.microsoft.com/office/drawing/2015/06/chart">
       <c:ext xmlns:c16r3="http://schemas.microsoft.com/office/drawing/2017/03/chart" uri="{56B9EC1D-385E-4148-901F-78D8002777C0}">
         <c16r3:dataDisplayOptions16>
           <c16r3:dispNaAsBlank val="1"/>
         </c16r3:dataDisplayOptions16>
       </c:ext>
     </c:extLst>
-    <c:showDLblsOverMax val="0"/>
   </c:chart>
   <c:spPr>
     <a:noFill/>
@@ -1498,7 +1498,7 @@
           <a:p>
             <a:fld id="{A8490EA5-CA6F-8D4B-8D24-9E860C725A80}" type="datetimeFigureOut">
               <a:rPr lang="fr-FR" smtClean="0"/>
-              <a:t>01/02/2018</a:t>
+              <a:t>05/02/2018</a:t>
             </a:fld>
             <a:endParaRPr lang="fr-FR"/>
           </a:p>
@@ -1540,7 +1540,7 @@
           <a:p>
             <a:fld id="{0E1C6588-574C-564D-9A5F-65E9E31ED340}" type="slidenum">
               <a:rPr lang="fr-FR" smtClean="0"/>
-              <a:t>‹N°›</a:t>
+              <a:t>‹#›</a:t>
             </a:fld>
             <a:endParaRPr lang="fr-FR"/>
           </a:p>
@@ -1663,7 +1663,7 @@
           <a:p>
             <a:fld id="{A8490EA5-CA6F-8D4B-8D24-9E860C725A80}" type="datetimeFigureOut">
               <a:rPr lang="fr-FR" smtClean="0"/>
-              <a:t>01/02/2018</a:t>
+              <a:t>05/02/2018</a:t>
             </a:fld>
             <a:endParaRPr lang="fr-FR"/>
           </a:p>
@@ -1705,7 +1705,7 @@
           <a:p>
             <a:fld id="{0E1C6588-574C-564D-9A5F-65E9E31ED340}" type="slidenum">
               <a:rPr lang="fr-FR" smtClean="0"/>
-              <a:t>‹N°›</a:t>
+              <a:t>‹#›</a:t>
             </a:fld>
             <a:endParaRPr lang="fr-FR"/>
           </a:p>
@@ -1838,7 +1838,7 @@
           <a:p>
             <a:fld id="{A8490EA5-CA6F-8D4B-8D24-9E860C725A80}" type="datetimeFigureOut">
               <a:rPr lang="fr-FR" smtClean="0"/>
-              <a:t>01/02/2018</a:t>
+              <a:t>05/02/2018</a:t>
             </a:fld>
             <a:endParaRPr lang="fr-FR"/>
           </a:p>
@@ -1880,7 +1880,7 @@
           <a:p>
             <a:fld id="{0E1C6588-574C-564D-9A5F-65E9E31ED340}" type="slidenum">
               <a:rPr lang="fr-FR" smtClean="0"/>
-              <a:t>‹N°›</a:t>
+              <a:t>‹#›</a:t>
             </a:fld>
             <a:endParaRPr lang="fr-FR"/>
           </a:p>
@@ -2003,7 +2003,7 @@
           <a:p>
             <a:fld id="{A8490EA5-CA6F-8D4B-8D24-9E860C725A80}" type="datetimeFigureOut">
               <a:rPr lang="fr-FR" smtClean="0"/>
-              <a:t>01/02/2018</a:t>
+              <a:t>05/02/2018</a:t>
             </a:fld>
             <a:endParaRPr lang="fr-FR"/>
           </a:p>
@@ -2045,7 +2045,7 @@
           <a:p>
             <a:fld id="{0E1C6588-574C-564D-9A5F-65E9E31ED340}" type="slidenum">
               <a:rPr lang="fr-FR" smtClean="0"/>
-              <a:t>‹N°›</a:t>
+              <a:t>‹#›</a:t>
             </a:fld>
             <a:endParaRPr lang="fr-FR"/>
           </a:p>
@@ -2242,7 +2242,7 @@
           <a:p>
             <a:fld id="{A8490EA5-CA6F-8D4B-8D24-9E860C725A80}" type="datetimeFigureOut">
               <a:rPr lang="fr-FR" smtClean="0"/>
-              <a:t>01/02/2018</a:t>
+              <a:t>05/02/2018</a:t>
             </a:fld>
             <a:endParaRPr lang="fr-FR"/>
           </a:p>
@@ -2284,7 +2284,7 @@
           <a:p>
             <a:fld id="{0E1C6588-574C-564D-9A5F-65E9E31ED340}" type="slidenum">
               <a:rPr lang="fr-FR" smtClean="0"/>
-              <a:t>‹N°›</a:t>
+              <a:t>‹#›</a:t>
             </a:fld>
             <a:endParaRPr lang="fr-FR"/>
           </a:p>
@@ -2469,7 +2469,7 @@
           <a:p>
             <a:fld id="{A8490EA5-CA6F-8D4B-8D24-9E860C725A80}" type="datetimeFigureOut">
               <a:rPr lang="fr-FR" smtClean="0"/>
-              <a:t>01/02/2018</a:t>
+              <a:t>05/02/2018</a:t>
             </a:fld>
             <a:endParaRPr lang="fr-FR"/>
           </a:p>
@@ -2511,7 +2511,7 @@
           <a:p>
             <a:fld id="{0E1C6588-574C-564D-9A5F-65E9E31ED340}" type="slidenum">
               <a:rPr lang="fr-FR" smtClean="0"/>
-              <a:t>‹N°›</a:t>
+              <a:t>‹#›</a:t>
             </a:fld>
             <a:endParaRPr lang="fr-FR"/>
           </a:p>
@@ -2831,7 +2831,7 @@
           <a:p>
             <a:fld id="{A8490EA5-CA6F-8D4B-8D24-9E860C725A80}" type="datetimeFigureOut">
               <a:rPr lang="fr-FR" smtClean="0"/>
-              <a:t>01/02/2018</a:t>
+              <a:t>05/02/2018</a:t>
             </a:fld>
             <a:endParaRPr lang="fr-FR"/>
           </a:p>
@@ -2873,7 +2873,7 @@
           <a:p>
             <a:fld id="{0E1C6588-574C-564D-9A5F-65E9E31ED340}" type="slidenum">
               <a:rPr lang="fr-FR" smtClean="0"/>
-              <a:t>‹N°›</a:t>
+              <a:t>‹#›</a:t>
             </a:fld>
             <a:endParaRPr lang="fr-FR"/>
           </a:p>
@@ -2944,7 +2944,7 @@
           <a:p>
             <a:fld id="{A8490EA5-CA6F-8D4B-8D24-9E860C725A80}" type="datetimeFigureOut">
               <a:rPr lang="fr-FR" smtClean="0"/>
-              <a:t>01/02/2018</a:t>
+              <a:t>05/02/2018</a:t>
             </a:fld>
             <a:endParaRPr lang="fr-FR"/>
           </a:p>
@@ -2986,7 +2986,7 @@
           <a:p>
             <a:fld id="{0E1C6588-574C-564D-9A5F-65E9E31ED340}" type="slidenum">
               <a:rPr lang="fr-FR" smtClean="0"/>
-              <a:t>‹N°›</a:t>
+              <a:t>‹#›</a:t>
             </a:fld>
             <a:endParaRPr lang="fr-FR"/>
           </a:p>
@@ -3034,7 +3034,7 @@
           <a:p>
             <a:fld id="{A8490EA5-CA6F-8D4B-8D24-9E860C725A80}" type="datetimeFigureOut">
               <a:rPr lang="fr-FR" smtClean="0"/>
-              <a:t>01/02/2018</a:t>
+              <a:t>05/02/2018</a:t>
             </a:fld>
             <a:endParaRPr lang="fr-FR"/>
           </a:p>
@@ -3076,7 +3076,7 @@
           <a:p>
             <a:fld id="{0E1C6588-574C-564D-9A5F-65E9E31ED340}" type="slidenum">
               <a:rPr lang="fr-FR" smtClean="0"/>
-              <a:t>‹N°›</a:t>
+              <a:t>‹#›</a:t>
             </a:fld>
             <a:endParaRPr lang="fr-FR"/>
           </a:p>
@@ -3306,7 +3306,7 @@
           <a:p>
             <a:fld id="{A8490EA5-CA6F-8D4B-8D24-9E860C725A80}" type="datetimeFigureOut">
               <a:rPr lang="fr-FR" smtClean="0"/>
-              <a:t>01/02/2018</a:t>
+              <a:t>05/02/2018</a:t>
             </a:fld>
             <a:endParaRPr lang="fr-FR"/>
           </a:p>
@@ -3348,7 +3348,7 @@
           <a:p>
             <a:fld id="{0E1C6588-574C-564D-9A5F-65E9E31ED340}" type="slidenum">
               <a:rPr lang="fr-FR" smtClean="0"/>
-              <a:t>‹N°›</a:t>
+              <a:t>‹#›</a:t>
             </a:fld>
             <a:endParaRPr lang="fr-FR"/>
           </a:p>
@@ -3558,7 +3558,7 @@
           <a:p>
             <a:fld id="{A8490EA5-CA6F-8D4B-8D24-9E860C725A80}" type="datetimeFigureOut">
               <a:rPr lang="fr-FR" smtClean="0"/>
-              <a:t>01/02/2018</a:t>
+              <a:t>05/02/2018</a:t>
             </a:fld>
             <a:endParaRPr lang="fr-FR"/>
           </a:p>
@@ -3600,7 +3600,7 @@
           <a:p>
             <a:fld id="{0E1C6588-574C-564D-9A5F-65E9E31ED340}" type="slidenum">
               <a:rPr lang="fr-FR" smtClean="0"/>
-              <a:t>‹N°›</a:t>
+              <a:t>‹#›</a:t>
             </a:fld>
             <a:endParaRPr lang="fr-FR"/>
           </a:p>
@@ -3766,7 +3766,7 @@
           <a:p>
             <a:fld id="{A8490EA5-CA6F-8D4B-8D24-9E860C725A80}" type="datetimeFigureOut">
               <a:rPr lang="fr-FR" smtClean="0"/>
-              <a:t>01/02/2018</a:t>
+              <a:t>05/02/2018</a:t>
             </a:fld>
             <a:endParaRPr lang="fr-FR"/>
           </a:p>
@@ -3844,7 +3844,7 @@
           <a:p>
             <a:fld id="{0E1C6588-574C-564D-9A5F-65E9E31ED340}" type="slidenum">
               <a:rPr lang="fr-FR" smtClean="0"/>
-              <a:t>‹N°›</a:t>
+              <a:t>‹#›</a:t>
             </a:fld>
             <a:endParaRPr lang="fr-FR"/>
           </a:p>
@@ -4176,7 +4176,7 @@
           <p:cNvPr id="94" name="TextBox 102">
             <a:extLst>
               <a:ext uri="{FF2B5EF4-FFF2-40B4-BE49-F238E27FC236}">
-                <a16:creationId xmlns:a16="http://schemas.microsoft.com/office/drawing/2014/main" id="{B4547BA0-37B5-4631-8324-ABC068B86951}"/>
+                <a16:creationId xmlns:a16="http://schemas.microsoft.com/office/drawing/2014/main" xmlns="" id="{B4547BA0-37B5-4631-8324-ABC068B86951}"/>
               </a:ext>
             </a:extLst>
           </p:cNvPr>
@@ -4495,8 +4495,8 @@
           </a:p>
         </p:txBody>
       </p:sp>
-      <mc:AlternateContent xmlns:mc="http://schemas.openxmlformats.org/markup-compatibility/2006">
-        <mc:Choice xmlns:a14="http://schemas.microsoft.com/office/drawing/2010/main" Requires="a14">
+      <mc:AlternateContent xmlns:mc="http://schemas.openxmlformats.org/markup-compatibility/2006" xmlns:a14="http://schemas.microsoft.com/office/drawing/2010/main">
+        <mc:Choice Requires="a14">
           <p:sp>
             <p:nvSpPr>
               <p:cNvPr id="27" name="TextBox 19"/>
@@ -4841,7 +4841,7 @@
             </p:txBody>
           </p:sp>
         </mc:Choice>
-        <mc:Fallback>
+        <mc:Fallback xmlns="">
           <p:sp>
             <p:nvSpPr>
               <p:cNvPr id="27" name="TextBox 19"/>
@@ -5936,8 +5936,8 @@
           </p:sp>
         </mc:Fallback>
       </mc:AlternateContent>
-      <mc:AlternateContent xmlns:mc="http://schemas.openxmlformats.org/markup-compatibility/2006">
-        <mc:Choice xmlns:a14="http://schemas.microsoft.com/office/drawing/2010/main" Requires="a14">
+      <mc:AlternateContent xmlns:mc="http://schemas.openxmlformats.org/markup-compatibility/2006" xmlns:a14="http://schemas.microsoft.com/office/drawing/2010/main">
+        <mc:Choice Requires="a14">
           <p:sp>
             <p:nvSpPr>
               <p:cNvPr id="75" name="TextBox 74"/>
@@ -6136,7 +6136,7 @@
             </p:txBody>
           </p:sp>
         </mc:Choice>
-        <mc:Fallback>
+        <mc:Fallback xmlns="">
           <p:sp>
             <p:nvSpPr>
               <p:cNvPr id="75" name="TextBox 74"/>
@@ -6178,8 +6178,8 @@
           </p:sp>
         </mc:Fallback>
       </mc:AlternateContent>
-      <mc:AlternateContent xmlns:mc="http://schemas.openxmlformats.org/markup-compatibility/2006" xmlns:a14="http://schemas.microsoft.com/office/drawing/2010/main">
-        <mc:Choice Requires="a14">
+      <mc:AlternateContent xmlns:mc="http://schemas.openxmlformats.org/markup-compatibility/2006">
+        <mc:Choice xmlns:a14="http://schemas.microsoft.com/office/drawing/2010/main" Requires="a14">
           <p:sp>
             <p:nvSpPr>
               <p:cNvPr id="77" name="TextBox 76"/>
@@ -6189,7 +6189,7 @@
             <p:spPr>
               <a:xfrm>
                 <a:off x="4968313" y="4008665"/>
-                <a:ext cx="697690" cy="172291"/>
+                <a:ext cx="697050" cy="169277"/>
               </a:xfrm>
               <a:prstGeom prst="rect">
                 <a:avLst/>
@@ -6247,7 +6247,7 @@
                           <a:latin typeface="Cambria Math" panose="02040503050406030204" pitchFamily="18" charset="0"/>
                           <a:ea typeface="Cambria Math" panose="02040503050406030204" pitchFamily="18" charset="0"/>
                         </a:rPr>
-                        <m:t>𝑎</m:t>
+                        <m:t>𝑏</m:t>
                       </m:r>
                       <m:sSup>
                         <m:sSupPr>
@@ -6273,7 +6273,7 @@
                               <a:latin typeface="Cambria Math" panose="02040503050406030204" pitchFamily="18" charset="0"/>
                               <a:ea typeface="Cambria Math" panose="02040503050406030204" pitchFamily="18" charset="0"/>
                             </a:rPr>
-                            <m:t>𝑏</m:t>
+                            <m:t>𝑎</m:t>
                           </m:r>
                         </m:sup>
                       </m:sSup>
@@ -6285,7 +6285,7 @@
             </p:txBody>
           </p:sp>
         </mc:Choice>
-        <mc:Fallback xmlns="">
+        <mc:Fallback>
           <p:sp>
             <p:nvSpPr>
               <p:cNvPr id="77" name="TextBox 76"/>
@@ -6297,7 +6297,7 @@
             <p:spPr>
               <a:xfrm>
                 <a:off x="4968313" y="4008665"/>
-                <a:ext cx="697690" cy="172291"/>
+                <a:ext cx="697050" cy="169277"/>
               </a:xfrm>
               <a:prstGeom prst="rect">
                 <a:avLst/>
@@ -6305,7 +6305,7 @@
               <a:blipFill rotWithShape="0">
                 <a:blip r:embed="rId8"/>
                 <a:stretch>
-                  <a:fillRect l="-7018" t="-3571" r="-2632" b="-35714"/>
+                  <a:fillRect l="-7018" r="-1754" b="-40741"/>
                 </a:stretch>
               </a:blipFill>
             </p:spPr>
@@ -6448,8 +6448,8 @@
           </a:p>
         </p:txBody>
       </p:sp>
-      <mc:AlternateContent xmlns:mc="http://schemas.openxmlformats.org/markup-compatibility/2006">
-        <mc:Choice xmlns:a14="http://schemas.microsoft.com/office/drawing/2010/main" Requires="a14">
+      <mc:AlternateContent xmlns:mc="http://schemas.openxmlformats.org/markup-compatibility/2006" xmlns:a14="http://schemas.microsoft.com/office/drawing/2010/main">
+        <mc:Choice Requires="a14">
           <p:sp>
             <p:nvSpPr>
               <p:cNvPr id="31" name="TextBox 30"/>
@@ -6685,7 +6685,7 @@
             </p:txBody>
           </p:sp>
         </mc:Choice>
-        <mc:Fallback>
+        <mc:Fallback xmlns="">
           <p:sp>
             <p:nvSpPr>
               <p:cNvPr id="31" name="TextBox 30"/>
@@ -7037,7 +7037,7 @@
           <p:cNvPr id="49" name="Groupe 48">
             <a:extLst>
               <a:ext uri="{FF2B5EF4-FFF2-40B4-BE49-F238E27FC236}">
-                <a16:creationId xmlns:a16="http://schemas.microsoft.com/office/drawing/2014/main" id="{AB032BDB-2565-4D71-80FD-BE57A68770B4}"/>
+                <a16:creationId xmlns:a16="http://schemas.microsoft.com/office/drawing/2014/main" xmlns="" id="{AB032BDB-2565-4D71-80FD-BE57A68770B4}"/>
               </a:ext>
             </a:extLst>
           </p:cNvPr>
@@ -7059,7 +7059,7 @@
             <p:cNvPr id="50" name="Connecteur droit 49">
               <a:extLst>
                 <a:ext uri="{FF2B5EF4-FFF2-40B4-BE49-F238E27FC236}">
-                  <a16:creationId xmlns:a16="http://schemas.microsoft.com/office/drawing/2014/main" id="{784EAA63-4361-4142-97E1-C243EB3A5FA3}"/>
+                  <a16:creationId xmlns:a16="http://schemas.microsoft.com/office/drawing/2014/main" xmlns="" id="{784EAA63-4361-4142-97E1-C243EB3A5FA3}"/>
                 </a:ext>
               </a:extLst>
             </p:cNvPr>
@@ -7099,7 +7099,7 @@
             <p:cNvPr id="51" name="Connecteur droit 50">
               <a:extLst>
                 <a:ext uri="{FF2B5EF4-FFF2-40B4-BE49-F238E27FC236}">
-                  <a16:creationId xmlns:a16="http://schemas.microsoft.com/office/drawing/2014/main" id="{01A845D8-2CE1-4CB0-BB0D-F7E13F8FA999}"/>
+                  <a16:creationId xmlns:a16="http://schemas.microsoft.com/office/drawing/2014/main" xmlns="" id="{01A845D8-2CE1-4CB0-BB0D-F7E13F8FA999}"/>
                 </a:ext>
               </a:extLst>
             </p:cNvPr>
@@ -7139,7 +7139,7 @@
             <p:cNvPr id="53" name="Connecteur droit 52">
               <a:extLst>
                 <a:ext uri="{FF2B5EF4-FFF2-40B4-BE49-F238E27FC236}">
-                  <a16:creationId xmlns:a16="http://schemas.microsoft.com/office/drawing/2014/main" id="{3E25EF25-8A2A-433B-8E21-A207D639CFFC}"/>
+                  <a16:creationId xmlns:a16="http://schemas.microsoft.com/office/drawing/2014/main" xmlns="" id="{3E25EF25-8A2A-433B-8E21-A207D639CFFC}"/>
                 </a:ext>
               </a:extLst>
             </p:cNvPr>
@@ -7181,7 +7181,7 @@
                 <p:cNvPr id="54" name="ZoneTexte 53">
                   <a:extLst>
                     <a:ext uri="{FF2B5EF4-FFF2-40B4-BE49-F238E27FC236}">
-                      <a16:creationId xmlns:a16="http://schemas.microsoft.com/office/drawing/2014/main" id="{DDFF042B-8AE8-4662-ACB0-73BAC3690636}"/>
+                      <a16:creationId xmlns:a16="http://schemas.microsoft.com/office/drawing/2014/main" xmlns="" id="{DDFF042B-8AE8-4662-ACB0-73BAC3690636}"/>
                     </a:ext>
                   </a:extLst>
                 </p:cNvPr>
@@ -7336,7 +7336,7 @@
                 <p:cNvPr id="55" name="ZoneTexte 54">
                   <a:extLst>
                     <a:ext uri="{FF2B5EF4-FFF2-40B4-BE49-F238E27FC236}">
-                      <a16:creationId xmlns:a16="http://schemas.microsoft.com/office/drawing/2014/main" id="{504D86AE-3572-4429-B2BD-B7A71B9612B0}"/>
+                      <a16:creationId xmlns:a16="http://schemas.microsoft.com/office/drawing/2014/main" xmlns="" id="{504D86AE-3572-4429-B2BD-B7A71B9612B0}"/>
                     </a:ext>
                   </a:extLst>
                 </p:cNvPr>
@@ -7489,7 +7489,7 @@
                 <p:cNvPr id="56" name="ZoneTexte 55">
                   <a:extLst>
                     <a:ext uri="{FF2B5EF4-FFF2-40B4-BE49-F238E27FC236}">
-                      <a16:creationId xmlns:a16="http://schemas.microsoft.com/office/drawing/2014/main" id="{890482B5-BE1A-40CB-B391-AE7C0AD37D2A}"/>
+                      <a16:creationId xmlns:a16="http://schemas.microsoft.com/office/drawing/2014/main" xmlns="" id="{890482B5-BE1A-40CB-B391-AE7C0AD37D2A}"/>
                     </a:ext>
                   </a:extLst>
                 </p:cNvPr>
@@ -7721,7 +7721,7 @@
                 <p:cNvPr id="58" name="ZoneTexte 57">
                   <a:extLst>
                     <a:ext uri="{FF2B5EF4-FFF2-40B4-BE49-F238E27FC236}">
-                      <a16:creationId xmlns:a16="http://schemas.microsoft.com/office/drawing/2014/main" id="{495F5CA5-A3AC-4DA3-B505-37EB48F34ADD}"/>
+                      <a16:creationId xmlns:a16="http://schemas.microsoft.com/office/drawing/2014/main" xmlns="" id="{495F5CA5-A3AC-4DA3-B505-37EB48F34ADD}"/>
                     </a:ext>
                   </a:extLst>
                 </p:cNvPr>
@@ -7953,7 +7953,7 @@
                 <p:cNvPr id="59" name="ZoneTexte 58">
                   <a:extLst>
                     <a:ext uri="{FF2B5EF4-FFF2-40B4-BE49-F238E27FC236}">
-                      <a16:creationId xmlns:a16="http://schemas.microsoft.com/office/drawing/2014/main" id="{7C568E3F-E383-4630-8347-82F234079446}"/>
+                      <a16:creationId xmlns:a16="http://schemas.microsoft.com/office/drawing/2014/main" xmlns="" id="{7C568E3F-E383-4630-8347-82F234079446}"/>
                     </a:ext>
                   </a:extLst>
                 </p:cNvPr>
@@ -8104,7 +8104,7 @@
             <p:cNvPr id="63" name="ZoneTexte 62">
               <a:extLst>
                 <a:ext uri="{FF2B5EF4-FFF2-40B4-BE49-F238E27FC236}">
-                  <a16:creationId xmlns:a16="http://schemas.microsoft.com/office/drawing/2014/main" id="{720A9898-D6EC-4B99-A522-FEE81F1DB4AE}"/>
+                  <a16:creationId xmlns:a16="http://schemas.microsoft.com/office/drawing/2014/main" xmlns="" id="{720A9898-D6EC-4B99-A522-FEE81F1DB4AE}"/>
                 </a:ext>
               </a:extLst>
             </p:cNvPr>
@@ -8139,7 +8139,7 @@
             <p:cNvPr id="64" name="ZoneTexte 63">
               <a:extLst>
                 <a:ext uri="{FF2B5EF4-FFF2-40B4-BE49-F238E27FC236}">
-                  <a16:creationId xmlns:a16="http://schemas.microsoft.com/office/drawing/2014/main" id="{7C942E7D-B77D-47D1-B5D8-0A2A677B301A}"/>
+                  <a16:creationId xmlns:a16="http://schemas.microsoft.com/office/drawing/2014/main" xmlns="" id="{7C942E7D-B77D-47D1-B5D8-0A2A677B301A}"/>
                 </a:ext>
               </a:extLst>
             </p:cNvPr>
@@ -8181,7 +8181,7 @@
             <p:cNvPr id="70" name="ZoneTexte 69">
               <a:extLst>
                 <a:ext uri="{FF2B5EF4-FFF2-40B4-BE49-F238E27FC236}">
-                  <a16:creationId xmlns:a16="http://schemas.microsoft.com/office/drawing/2014/main" id="{DF191EE8-4069-4050-937E-AA2F95551182}"/>
+                  <a16:creationId xmlns:a16="http://schemas.microsoft.com/office/drawing/2014/main" xmlns="" id="{DF191EE8-4069-4050-937E-AA2F95551182}"/>
                 </a:ext>
               </a:extLst>
             </p:cNvPr>
@@ -8221,8 +8221,8 @@
           </p:txBody>
         </p:sp>
       </p:grpSp>
-      <mc:AlternateContent xmlns:mc="http://schemas.openxmlformats.org/markup-compatibility/2006">
-        <mc:Choice xmlns:a14="http://schemas.microsoft.com/office/drawing/2010/main" Requires="a14">
+      <mc:AlternateContent xmlns:mc="http://schemas.openxmlformats.org/markup-compatibility/2006" xmlns:a14="http://schemas.microsoft.com/office/drawing/2010/main">
+        <mc:Choice Requires="a14">
           <p:sp>
             <p:nvSpPr>
               <p:cNvPr id="74" name="TextBox 73"/>
@@ -8538,7 +8538,7 @@
             </p:txBody>
           </p:sp>
         </mc:Choice>
-        <mc:Fallback>
+        <mc:Fallback xmlns="">
           <p:sp>
             <p:nvSpPr>
               <p:cNvPr id="74" name="TextBox 73"/>
@@ -8709,7 +8709,7 @@
               <p:cNvPr id="98" name="ZoneTexte 58">
                 <a:extLst>
                   <a:ext uri="{FF2B5EF4-FFF2-40B4-BE49-F238E27FC236}">
-                    <a16:creationId xmlns:a16="http://schemas.microsoft.com/office/drawing/2014/main" id="{7C568E3F-E383-4630-8347-82F234079446}"/>
+                    <a16:creationId xmlns:a16="http://schemas.microsoft.com/office/drawing/2014/main" xmlns="" id="{7C568E3F-E383-4630-8347-82F234079446}"/>
                   </a:ext>
                 </a:extLst>
               </p:cNvPr>
@@ -8860,7 +8860,7 @@
           <p:cNvPr id="78" name="Groupe 70">
             <a:extLst>
               <a:ext uri="{FF2B5EF4-FFF2-40B4-BE49-F238E27FC236}">
-                <a16:creationId xmlns:a16="http://schemas.microsoft.com/office/drawing/2014/main" id="{89D7123B-40C2-4AB2-81C3-610E9E09B9B6}"/>
+                <a16:creationId xmlns:a16="http://schemas.microsoft.com/office/drawing/2014/main" xmlns="" id="{89D7123B-40C2-4AB2-81C3-610E9E09B9B6}"/>
               </a:ext>
             </a:extLst>
           </p:cNvPr>
@@ -8882,7 +8882,7 @@
             <p:cNvPr id="79" name="Image 73">
               <a:extLst>
                 <a:ext uri="{FF2B5EF4-FFF2-40B4-BE49-F238E27FC236}">
-                  <a16:creationId xmlns:a16="http://schemas.microsoft.com/office/drawing/2014/main" id="{CDD56593-C067-4548-A7E2-B7A0CE54F7B1}"/>
+                  <a16:creationId xmlns:a16="http://schemas.microsoft.com/office/drawing/2014/main" xmlns="" id="{CDD56593-C067-4548-A7E2-B7A0CE54F7B1}"/>
                 </a:ext>
               </a:extLst>
             </p:cNvPr>
@@ -8911,7 +8911,7 @@
             <p:cNvPr id="80" name="ZoneTexte 75">
               <a:extLst>
                 <a:ext uri="{FF2B5EF4-FFF2-40B4-BE49-F238E27FC236}">
-                  <a16:creationId xmlns:a16="http://schemas.microsoft.com/office/drawing/2014/main" id="{8331F92D-6EBC-4F51-AAC3-9562A470C88F}"/>
+                  <a16:creationId xmlns:a16="http://schemas.microsoft.com/office/drawing/2014/main" xmlns="" id="{8331F92D-6EBC-4F51-AAC3-9562A470C88F}"/>
                 </a:ext>
               </a:extLst>
             </p:cNvPr>
@@ -8948,7 +8948,7 @@
             <p:cNvPr id="81" name="ZoneTexte 77">
               <a:extLst>
                 <a:ext uri="{FF2B5EF4-FFF2-40B4-BE49-F238E27FC236}">
-                  <a16:creationId xmlns:a16="http://schemas.microsoft.com/office/drawing/2014/main" id="{4AB29D26-7DD5-4F26-99D4-729E985C7009}"/>
+                  <a16:creationId xmlns:a16="http://schemas.microsoft.com/office/drawing/2014/main" xmlns="" id="{4AB29D26-7DD5-4F26-99D4-729E985C7009}"/>
                 </a:ext>
               </a:extLst>
             </p:cNvPr>
@@ -8984,7 +8984,7 @@
             <p:cNvPr id="82" name="ZoneTexte 78">
               <a:extLst>
                 <a:ext uri="{FF2B5EF4-FFF2-40B4-BE49-F238E27FC236}">
-                  <a16:creationId xmlns:a16="http://schemas.microsoft.com/office/drawing/2014/main" id="{10E8733F-9F09-4523-907B-142759F66B5D}"/>
+                  <a16:creationId xmlns:a16="http://schemas.microsoft.com/office/drawing/2014/main" xmlns="" id="{10E8733F-9F09-4523-907B-142759F66B5D}"/>
                 </a:ext>
               </a:extLst>
             </p:cNvPr>
@@ -9020,7 +9020,7 @@
             <p:cNvPr id="84" name="ZoneTexte 79">
               <a:extLst>
                 <a:ext uri="{FF2B5EF4-FFF2-40B4-BE49-F238E27FC236}">
-                  <a16:creationId xmlns:a16="http://schemas.microsoft.com/office/drawing/2014/main" id="{F8634C25-5090-4FF2-A745-1B943F3EF1A1}"/>
+                  <a16:creationId xmlns:a16="http://schemas.microsoft.com/office/drawing/2014/main" xmlns="" id="{F8634C25-5090-4FF2-A745-1B943F3EF1A1}"/>
                 </a:ext>
               </a:extLst>
             </p:cNvPr>
@@ -9056,7 +9056,7 @@
             <p:cNvPr id="86" name="ZoneTexte 80">
               <a:extLst>
                 <a:ext uri="{FF2B5EF4-FFF2-40B4-BE49-F238E27FC236}">
-                  <a16:creationId xmlns:a16="http://schemas.microsoft.com/office/drawing/2014/main" id="{8B9E6203-EC83-4C92-A511-98A74A6AB22F}"/>
+                  <a16:creationId xmlns:a16="http://schemas.microsoft.com/office/drawing/2014/main" xmlns="" id="{8B9E6203-EC83-4C92-A511-98A74A6AB22F}"/>
                 </a:ext>
               </a:extLst>
             </p:cNvPr>
@@ -9092,7 +9092,7 @@
             <p:cNvPr id="87" name="ZoneTexte 81">
               <a:extLst>
                 <a:ext uri="{FF2B5EF4-FFF2-40B4-BE49-F238E27FC236}">
-                  <a16:creationId xmlns:a16="http://schemas.microsoft.com/office/drawing/2014/main" id="{0B79BBC5-3700-45BC-8FB1-8CE2294000B3}"/>
+                  <a16:creationId xmlns:a16="http://schemas.microsoft.com/office/drawing/2014/main" xmlns="" id="{0B79BBC5-3700-45BC-8FB1-8CE2294000B3}"/>
                 </a:ext>
               </a:extLst>
             </p:cNvPr>
@@ -9128,7 +9128,7 @@
             <p:cNvPr id="90" name="ZoneTexte 83">
               <a:extLst>
                 <a:ext uri="{FF2B5EF4-FFF2-40B4-BE49-F238E27FC236}">
-                  <a16:creationId xmlns:a16="http://schemas.microsoft.com/office/drawing/2014/main" id="{D95FD43E-1041-4EBA-A4FD-B6C4F1A346DB}"/>
+                  <a16:creationId xmlns:a16="http://schemas.microsoft.com/office/drawing/2014/main" xmlns="" id="{D95FD43E-1041-4EBA-A4FD-B6C4F1A346DB}"/>
                 </a:ext>
               </a:extLst>
             </p:cNvPr>
@@ -9164,7 +9164,7 @@
             <p:cNvPr id="91" name="ZoneTexte 85">
               <a:extLst>
                 <a:ext uri="{FF2B5EF4-FFF2-40B4-BE49-F238E27FC236}">
-                  <a16:creationId xmlns:a16="http://schemas.microsoft.com/office/drawing/2014/main" id="{42DA62B9-4652-4A32-A896-64D54F3DF898}"/>
+                  <a16:creationId xmlns:a16="http://schemas.microsoft.com/office/drawing/2014/main" xmlns="" id="{42DA62B9-4652-4A32-A896-64D54F3DF898}"/>
                 </a:ext>
               </a:extLst>
             </p:cNvPr>
@@ -9203,7 +9203,7 @@
             <p:cNvPr id="92" name="ZoneTexte 86">
               <a:extLst>
                 <a:ext uri="{FF2B5EF4-FFF2-40B4-BE49-F238E27FC236}">
-                  <a16:creationId xmlns:a16="http://schemas.microsoft.com/office/drawing/2014/main" id="{282CF59A-1439-494C-B953-0B3245AF0C30}"/>
+                  <a16:creationId xmlns:a16="http://schemas.microsoft.com/office/drawing/2014/main" xmlns="" id="{282CF59A-1439-494C-B953-0B3245AF0C30}"/>
                 </a:ext>
               </a:extLst>
             </p:cNvPr>
@@ -9493,7 +9493,7 @@
           <p:cNvPr id="104" name="Graphique 89">
             <a:extLst>
               <a:ext uri="{FF2B5EF4-FFF2-40B4-BE49-F238E27FC236}">
-                <a16:creationId xmlns:a16="http://schemas.microsoft.com/office/drawing/2014/main" id="{D3B652C3-C9FF-4BEF-9269-B04D2F61FEAC}"/>
+                <a16:creationId xmlns:a16="http://schemas.microsoft.com/office/drawing/2014/main" xmlns="" id="{D3B652C3-C9FF-4BEF-9269-B04D2F61FEAC}"/>
               </a:ext>
             </a:extLst>
           </p:cNvPr>
@@ -9553,8 +9553,8 @@
           </a:p>
         </p:txBody>
       </p:sp>
-      <mc:AlternateContent xmlns:mc="http://schemas.openxmlformats.org/markup-compatibility/2006">
-        <mc:Choice xmlns:a14="http://schemas.microsoft.com/office/drawing/2010/main" Requires="a14">
+      <mc:AlternateContent xmlns:mc="http://schemas.openxmlformats.org/markup-compatibility/2006" xmlns:a14="http://schemas.microsoft.com/office/drawing/2010/main">
+        <mc:Choice Requires="a14">
           <p:sp>
             <p:nvSpPr>
               <p:cNvPr id="110" name="TextBox 109"/>
@@ -9720,7 +9720,7 @@
             </p:txBody>
           </p:sp>
         </mc:Choice>
-        <mc:Fallback>
+        <mc:Fallback xmlns="">
           <p:sp>
             <p:nvSpPr>
               <p:cNvPr id="110" name="TextBox 109"/>
@@ -9974,7 +9974,7 @@
           <p:cNvPr id="113" name="Groupe 37">
             <a:extLst>
               <a:ext uri="{FF2B5EF4-FFF2-40B4-BE49-F238E27FC236}">
-                <a16:creationId xmlns:a16="http://schemas.microsoft.com/office/drawing/2014/main" id="{2E3EBB30-0B91-497F-AF84-F2AA11CA7282}"/>
+                <a16:creationId xmlns:a16="http://schemas.microsoft.com/office/drawing/2014/main" xmlns="" id="{2E3EBB30-0B91-497F-AF84-F2AA11CA7282}"/>
               </a:ext>
             </a:extLst>
           </p:cNvPr>
@@ -9996,7 +9996,7 @@
             <p:cNvPr id="114" name="Image 39">
               <a:extLst>
                 <a:ext uri="{FF2B5EF4-FFF2-40B4-BE49-F238E27FC236}">
-                  <a16:creationId xmlns:a16="http://schemas.microsoft.com/office/drawing/2014/main" id="{3E8B0AF2-C6D7-4657-83BB-9BA480CD4BE1}"/>
+                  <a16:creationId xmlns:a16="http://schemas.microsoft.com/office/drawing/2014/main" xmlns="" id="{3E8B0AF2-C6D7-4657-83BB-9BA480CD4BE1}"/>
                 </a:ext>
               </a:extLst>
             </p:cNvPr>
@@ -10025,7 +10025,7 @@
             <p:cNvPr id="115" name="Accolade fermante 40">
               <a:extLst>
                 <a:ext uri="{FF2B5EF4-FFF2-40B4-BE49-F238E27FC236}">
-                  <a16:creationId xmlns:a16="http://schemas.microsoft.com/office/drawing/2014/main" id="{939B1627-0915-435F-A777-4608ED76D847}"/>
+                  <a16:creationId xmlns:a16="http://schemas.microsoft.com/office/drawing/2014/main" xmlns="" id="{939B1627-0915-435F-A777-4608ED76D847}"/>
                 </a:ext>
               </a:extLst>
             </p:cNvPr>
@@ -10069,7 +10069,7 @@
             <p:cNvPr id="116" name="Accolade fermante 41">
               <a:extLst>
                 <a:ext uri="{FF2B5EF4-FFF2-40B4-BE49-F238E27FC236}">
-                  <a16:creationId xmlns:a16="http://schemas.microsoft.com/office/drawing/2014/main" id="{4B6163BE-EFA6-4C31-9443-38808280EE31}"/>
+                  <a16:creationId xmlns:a16="http://schemas.microsoft.com/office/drawing/2014/main" xmlns="" id="{4B6163BE-EFA6-4C31-9443-38808280EE31}"/>
                 </a:ext>
               </a:extLst>
             </p:cNvPr>
@@ -10113,7 +10113,7 @@
             <p:cNvPr id="118" name="ZoneTexte 42">
               <a:extLst>
                 <a:ext uri="{FF2B5EF4-FFF2-40B4-BE49-F238E27FC236}">
-                  <a16:creationId xmlns:a16="http://schemas.microsoft.com/office/drawing/2014/main" id="{E2002905-8B78-466E-B32D-ECBA62B7412C}"/>
+                  <a16:creationId xmlns:a16="http://schemas.microsoft.com/office/drawing/2014/main" xmlns="" id="{E2002905-8B78-466E-B32D-ECBA62B7412C}"/>
                 </a:ext>
               </a:extLst>
             </p:cNvPr>
@@ -10156,7 +10156,7 @@
             <p:cNvPr id="119" name="ZoneTexte 43">
               <a:extLst>
                 <a:ext uri="{FF2B5EF4-FFF2-40B4-BE49-F238E27FC236}">
-                  <a16:creationId xmlns:a16="http://schemas.microsoft.com/office/drawing/2014/main" id="{93FD8743-B99C-40BE-A31B-0E02A7191D2A}"/>
+                  <a16:creationId xmlns:a16="http://schemas.microsoft.com/office/drawing/2014/main" xmlns="" id="{93FD8743-B99C-40BE-A31B-0E02A7191D2A}"/>
                 </a:ext>
               </a:extLst>
             </p:cNvPr>
@@ -10195,7 +10195,7 @@
             <p:cNvPr id="120" name="Accolade ouvrante 44">
               <a:extLst>
                 <a:ext uri="{FF2B5EF4-FFF2-40B4-BE49-F238E27FC236}">
-                  <a16:creationId xmlns:a16="http://schemas.microsoft.com/office/drawing/2014/main" id="{A14E7EAD-FE17-465F-A474-EBAB7D313B1F}"/>
+                  <a16:creationId xmlns:a16="http://schemas.microsoft.com/office/drawing/2014/main" xmlns="" id="{A14E7EAD-FE17-465F-A474-EBAB7D313B1F}"/>
                 </a:ext>
               </a:extLst>
             </p:cNvPr>
@@ -10239,7 +10239,7 @@
             <p:cNvPr id="121" name="Accolade ouvrante 45">
               <a:extLst>
                 <a:ext uri="{FF2B5EF4-FFF2-40B4-BE49-F238E27FC236}">
-                  <a16:creationId xmlns:a16="http://schemas.microsoft.com/office/drawing/2014/main" id="{A95AC5A2-7C68-456D-B2E7-66DEBD65B54D}"/>
+                  <a16:creationId xmlns:a16="http://schemas.microsoft.com/office/drawing/2014/main" xmlns="" id="{A95AC5A2-7C68-456D-B2E7-66DEBD65B54D}"/>
                 </a:ext>
               </a:extLst>
             </p:cNvPr>
@@ -10283,7 +10283,7 @@
             <p:cNvPr id="122" name="ZoneTexte 46">
               <a:extLst>
                 <a:ext uri="{FF2B5EF4-FFF2-40B4-BE49-F238E27FC236}">
-                  <a16:creationId xmlns:a16="http://schemas.microsoft.com/office/drawing/2014/main" id="{DA00F894-CC19-4F4B-8F01-2BF648AE28F7}"/>
+                  <a16:creationId xmlns:a16="http://schemas.microsoft.com/office/drawing/2014/main" xmlns="" id="{DA00F894-CC19-4F4B-8F01-2BF648AE28F7}"/>
                 </a:ext>
               </a:extLst>
             </p:cNvPr>
@@ -10322,7 +10322,7 @@
             <p:cNvPr id="123" name="ZoneTexte 47">
               <a:extLst>
                 <a:ext uri="{FF2B5EF4-FFF2-40B4-BE49-F238E27FC236}">
-                  <a16:creationId xmlns:a16="http://schemas.microsoft.com/office/drawing/2014/main" id="{04C70B37-4FAC-49C7-81AE-E8C65E878619}"/>
+                  <a16:creationId xmlns:a16="http://schemas.microsoft.com/office/drawing/2014/main" xmlns="" id="{04C70B37-4FAC-49C7-81AE-E8C65E878619}"/>
                 </a:ext>
               </a:extLst>
             </p:cNvPr>
@@ -10392,7 +10392,7 @@
           <p:cNvPr id="157" name="Groupe 156">
             <a:extLst>
               <a:ext uri="{FF2B5EF4-FFF2-40B4-BE49-F238E27FC236}">
-                <a16:creationId xmlns:a16="http://schemas.microsoft.com/office/drawing/2014/main" id="{BC1F56CF-1EEC-4286-8995-17B3BD5EA421}"/>
+                <a16:creationId xmlns:a16="http://schemas.microsoft.com/office/drawing/2014/main" xmlns="" id="{BC1F56CF-1EEC-4286-8995-17B3BD5EA421}"/>
               </a:ext>
             </a:extLst>
           </p:cNvPr>
@@ -10414,7 +10414,7 @@
             <p:cNvPr id="158" name="Groupe 157">
               <a:extLst>
                 <a:ext uri="{FF2B5EF4-FFF2-40B4-BE49-F238E27FC236}">
-                  <a16:creationId xmlns:a16="http://schemas.microsoft.com/office/drawing/2014/main" id="{428512D3-C90C-4FB6-AB38-C3FCDAFBAA8E}"/>
+                  <a16:creationId xmlns:a16="http://schemas.microsoft.com/office/drawing/2014/main" xmlns="" id="{428512D3-C90C-4FB6-AB38-C3FCDAFBAA8E}"/>
                 </a:ext>
               </a:extLst>
             </p:cNvPr>
@@ -10436,7 +10436,7 @@
                   <p:cNvPr id="176" name="ZoneTexte 175">
                     <a:extLst>
                       <a:ext uri="{FF2B5EF4-FFF2-40B4-BE49-F238E27FC236}">
-                        <a16:creationId xmlns:a16="http://schemas.microsoft.com/office/drawing/2014/main" id="{BDD5A742-83E1-4E92-8D3F-3C397E4F9AB3}"/>
+                        <a16:creationId xmlns:a16="http://schemas.microsoft.com/office/drawing/2014/main" xmlns="" id="{BDD5A742-83E1-4E92-8D3F-3C397E4F9AB3}"/>
                       </a:ext>
                     </a:extLst>
                   </p:cNvPr>
@@ -10574,7 +10574,7 @@
                   <p:cNvPr id="177" name="ZoneTexte 176">
                     <a:extLst>
                       <a:ext uri="{FF2B5EF4-FFF2-40B4-BE49-F238E27FC236}">
-                        <a16:creationId xmlns:a16="http://schemas.microsoft.com/office/drawing/2014/main" id="{3D846339-D2A4-4A22-B111-D6F70C2C6CEF}"/>
+                        <a16:creationId xmlns:a16="http://schemas.microsoft.com/office/drawing/2014/main" xmlns="" id="{3D846339-D2A4-4A22-B111-D6F70C2C6CEF}"/>
                       </a:ext>
                     </a:extLst>
                   </p:cNvPr>
@@ -10712,7 +10712,7 @@
                   <p:cNvPr id="178" name="ZoneTexte 177">
                     <a:extLst>
                       <a:ext uri="{FF2B5EF4-FFF2-40B4-BE49-F238E27FC236}">
-                        <a16:creationId xmlns:a16="http://schemas.microsoft.com/office/drawing/2014/main" id="{D95D3851-08B9-4602-81BE-5374A4D5B67F}"/>
+                        <a16:creationId xmlns:a16="http://schemas.microsoft.com/office/drawing/2014/main" xmlns="" id="{D95D3851-08B9-4602-81BE-5374A4D5B67F}"/>
                       </a:ext>
                     </a:extLst>
                   </p:cNvPr>
@@ -10850,7 +10850,7 @@
                   <p:cNvPr id="179" name="ZoneTexte 178">
                     <a:extLst>
                       <a:ext uri="{FF2B5EF4-FFF2-40B4-BE49-F238E27FC236}">
-                        <a16:creationId xmlns:a16="http://schemas.microsoft.com/office/drawing/2014/main" id="{50EB7433-8E39-4C81-9C3B-F2C25BF13985}"/>
+                        <a16:creationId xmlns:a16="http://schemas.microsoft.com/office/drawing/2014/main" xmlns="" id="{50EB7433-8E39-4C81-9C3B-F2C25BF13985}"/>
                       </a:ext>
                     </a:extLst>
                   </p:cNvPr>
@@ -10986,7 +10986,7 @@
               <p:cNvPr id="180" name="Groupe 179">
                 <a:extLst>
                   <a:ext uri="{FF2B5EF4-FFF2-40B4-BE49-F238E27FC236}">
-                    <a16:creationId xmlns:a16="http://schemas.microsoft.com/office/drawing/2014/main" id="{3AF1CDA2-7F8A-4FFE-9603-3946DFBE35F2}"/>
+                    <a16:creationId xmlns:a16="http://schemas.microsoft.com/office/drawing/2014/main" xmlns="" id="{3AF1CDA2-7F8A-4FFE-9603-3946DFBE35F2}"/>
                   </a:ext>
                 </a:extLst>
               </p:cNvPr>
@@ -11006,7 +11006,7 @@
                 <p:cNvPr id="196" name="Forme libre : forme 195">
                   <a:extLst>
                     <a:ext uri="{FF2B5EF4-FFF2-40B4-BE49-F238E27FC236}">
-                      <a16:creationId xmlns:a16="http://schemas.microsoft.com/office/drawing/2014/main" id="{B26D69A5-E16F-48CC-89E9-59DD92D1EADB}"/>
+                      <a16:creationId xmlns:a16="http://schemas.microsoft.com/office/drawing/2014/main" xmlns="" id="{B26D69A5-E16F-48CC-89E9-59DD92D1EADB}"/>
                     </a:ext>
                   </a:extLst>
                 </p:cNvPr>
@@ -11091,7 +11091,7 @@
                 <p:cNvPr id="197" name="Connecteur droit avec flèche 196">
                   <a:extLst>
                     <a:ext uri="{FF2B5EF4-FFF2-40B4-BE49-F238E27FC236}">
-                      <a16:creationId xmlns:a16="http://schemas.microsoft.com/office/drawing/2014/main" id="{0CD60577-A4D3-4F26-8787-7FA1AA3F3120}"/>
+                      <a16:creationId xmlns:a16="http://schemas.microsoft.com/office/drawing/2014/main" xmlns="" id="{0CD60577-A4D3-4F26-8787-7FA1AA3F3120}"/>
                     </a:ext>
                   </a:extLst>
                 </p:cNvPr>
@@ -11133,7 +11133,7 @@
               <p:cNvPr id="181" name="Groupe 180">
                 <a:extLst>
                   <a:ext uri="{FF2B5EF4-FFF2-40B4-BE49-F238E27FC236}">
-                    <a16:creationId xmlns:a16="http://schemas.microsoft.com/office/drawing/2014/main" id="{A72AD089-F435-4C1C-94B0-5B1DB77745D5}"/>
+                    <a16:creationId xmlns:a16="http://schemas.microsoft.com/office/drawing/2014/main" xmlns="" id="{A72AD089-F435-4C1C-94B0-5B1DB77745D5}"/>
                   </a:ext>
                 </a:extLst>
               </p:cNvPr>
@@ -11153,7 +11153,7 @@
                 <p:cNvPr id="194" name="Forme libre : forme 193">
                   <a:extLst>
                     <a:ext uri="{FF2B5EF4-FFF2-40B4-BE49-F238E27FC236}">
-                      <a16:creationId xmlns:a16="http://schemas.microsoft.com/office/drawing/2014/main" id="{E76C2658-704C-484D-B512-277D4BAB7E81}"/>
+                      <a16:creationId xmlns:a16="http://schemas.microsoft.com/office/drawing/2014/main" xmlns="" id="{E76C2658-704C-484D-B512-277D4BAB7E81}"/>
                     </a:ext>
                   </a:extLst>
                 </p:cNvPr>
@@ -11238,7 +11238,7 @@
                 <p:cNvPr id="195" name="Connecteur droit avec flèche 194">
                   <a:extLst>
                     <a:ext uri="{FF2B5EF4-FFF2-40B4-BE49-F238E27FC236}">
-                      <a16:creationId xmlns:a16="http://schemas.microsoft.com/office/drawing/2014/main" id="{DD9434F0-63A7-45EA-83CA-499438006B8F}"/>
+                      <a16:creationId xmlns:a16="http://schemas.microsoft.com/office/drawing/2014/main" xmlns="" id="{DD9434F0-63A7-45EA-83CA-499438006B8F}"/>
                     </a:ext>
                   </a:extLst>
                 </p:cNvPr>
@@ -11280,7 +11280,7 @@
               <p:cNvPr id="182" name="Groupe 181">
                 <a:extLst>
                   <a:ext uri="{FF2B5EF4-FFF2-40B4-BE49-F238E27FC236}">
-                    <a16:creationId xmlns:a16="http://schemas.microsoft.com/office/drawing/2014/main" id="{1E1206C1-856D-4BAC-9F08-C86A385C453B}"/>
+                    <a16:creationId xmlns:a16="http://schemas.microsoft.com/office/drawing/2014/main" xmlns="" id="{1E1206C1-856D-4BAC-9F08-C86A385C453B}"/>
                   </a:ext>
                 </a:extLst>
               </p:cNvPr>
@@ -11300,7 +11300,7 @@
                 <p:cNvPr id="192" name="Forme libre : forme 191">
                   <a:extLst>
                     <a:ext uri="{FF2B5EF4-FFF2-40B4-BE49-F238E27FC236}">
-                      <a16:creationId xmlns:a16="http://schemas.microsoft.com/office/drawing/2014/main" id="{87EBE6BA-9FA6-482F-A4DD-65961C58CBF6}"/>
+                      <a16:creationId xmlns:a16="http://schemas.microsoft.com/office/drawing/2014/main" xmlns="" id="{87EBE6BA-9FA6-482F-A4DD-65961C58CBF6}"/>
                     </a:ext>
                   </a:extLst>
                 </p:cNvPr>
@@ -11385,7 +11385,7 @@
                 <p:cNvPr id="193" name="Connecteur droit avec flèche 192">
                   <a:extLst>
                     <a:ext uri="{FF2B5EF4-FFF2-40B4-BE49-F238E27FC236}">
-                      <a16:creationId xmlns:a16="http://schemas.microsoft.com/office/drawing/2014/main" id="{9C625A16-024C-402C-A14E-00CC1C72C156}"/>
+                      <a16:creationId xmlns:a16="http://schemas.microsoft.com/office/drawing/2014/main" xmlns="" id="{9C625A16-024C-402C-A14E-00CC1C72C156}"/>
                     </a:ext>
                   </a:extLst>
                 </p:cNvPr>
@@ -11427,7 +11427,7 @@
               <p:cNvPr id="183" name="Groupe 182">
                 <a:extLst>
                   <a:ext uri="{FF2B5EF4-FFF2-40B4-BE49-F238E27FC236}">
-                    <a16:creationId xmlns:a16="http://schemas.microsoft.com/office/drawing/2014/main" id="{38CB0DD7-198B-496B-971F-60231FA5237A}"/>
+                    <a16:creationId xmlns:a16="http://schemas.microsoft.com/office/drawing/2014/main" xmlns="" id="{38CB0DD7-198B-496B-971F-60231FA5237A}"/>
                   </a:ext>
                 </a:extLst>
               </p:cNvPr>
@@ -11447,7 +11447,7 @@
                 <p:cNvPr id="190" name="Forme libre : forme 189">
                   <a:extLst>
                     <a:ext uri="{FF2B5EF4-FFF2-40B4-BE49-F238E27FC236}">
-                      <a16:creationId xmlns:a16="http://schemas.microsoft.com/office/drawing/2014/main" id="{244AFC75-5385-4F16-8831-B5597B211E39}"/>
+                      <a16:creationId xmlns:a16="http://schemas.microsoft.com/office/drawing/2014/main" xmlns="" id="{244AFC75-5385-4F16-8831-B5597B211E39}"/>
                     </a:ext>
                   </a:extLst>
                 </p:cNvPr>
@@ -11532,7 +11532,7 @@
                 <p:cNvPr id="191" name="Connecteur droit avec flèche 190">
                   <a:extLst>
                     <a:ext uri="{FF2B5EF4-FFF2-40B4-BE49-F238E27FC236}">
-                      <a16:creationId xmlns:a16="http://schemas.microsoft.com/office/drawing/2014/main" id="{15F93B16-6426-4959-A0FB-28EC439DD2C8}"/>
+                      <a16:creationId xmlns:a16="http://schemas.microsoft.com/office/drawing/2014/main" xmlns="" id="{15F93B16-6426-4959-A0FB-28EC439DD2C8}"/>
                     </a:ext>
                   </a:extLst>
                 </p:cNvPr>
@@ -11574,7 +11574,7 @@
               <p:cNvPr id="184" name="Groupe 183">
                 <a:extLst>
                   <a:ext uri="{FF2B5EF4-FFF2-40B4-BE49-F238E27FC236}">
-                    <a16:creationId xmlns:a16="http://schemas.microsoft.com/office/drawing/2014/main" id="{526A49B2-F6A8-4284-962D-154CC1F1767D}"/>
+                    <a16:creationId xmlns:a16="http://schemas.microsoft.com/office/drawing/2014/main" xmlns="" id="{526A49B2-F6A8-4284-962D-154CC1F1767D}"/>
                   </a:ext>
                 </a:extLst>
               </p:cNvPr>
@@ -11594,7 +11594,7 @@
                 <p:cNvPr id="188" name="Forme libre : forme 187">
                   <a:extLst>
                     <a:ext uri="{FF2B5EF4-FFF2-40B4-BE49-F238E27FC236}">
-                      <a16:creationId xmlns:a16="http://schemas.microsoft.com/office/drawing/2014/main" id="{DA708B19-1947-434F-80C2-B45A8A565D43}"/>
+                      <a16:creationId xmlns:a16="http://schemas.microsoft.com/office/drawing/2014/main" xmlns="" id="{DA708B19-1947-434F-80C2-B45A8A565D43}"/>
                     </a:ext>
                   </a:extLst>
                 </p:cNvPr>
@@ -11679,7 +11679,7 @@
                 <p:cNvPr id="189" name="Connecteur droit avec flèche 188">
                   <a:extLst>
                     <a:ext uri="{FF2B5EF4-FFF2-40B4-BE49-F238E27FC236}">
-                      <a16:creationId xmlns:a16="http://schemas.microsoft.com/office/drawing/2014/main" id="{4AA2B17A-8649-4837-80C9-D825A54E7730}"/>
+                      <a16:creationId xmlns:a16="http://schemas.microsoft.com/office/drawing/2014/main" xmlns="" id="{4AA2B17A-8649-4837-80C9-D825A54E7730}"/>
                     </a:ext>
                   </a:extLst>
                 </p:cNvPr>
@@ -11721,7 +11721,7 @@
               <p:cNvPr id="185" name="Groupe 184">
                 <a:extLst>
                   <a:ext uri="{FF2B5EF4-FFF2-40B4-BE49-F238E27FC236}">
-                    <a16:creationId xmlns:a16="http://schemas.microsoft.com/office/drawing/2014/main" id="{86AB3A9E-99D9-4F05-89C8-03C49DAA53CA}"/>
+                    <a16:creationId xmlns:a16="http://schemas.microsoft.com/office/drawing/2014/main" xmlns="" id="{86AB3A9E-99D9-4F05-89C8-03C49DAA53CA}"/>
                   </a:ext>
                 </a:extLst>
               </p:cNvPr>
@@ -11741,7 +11741,7 @@
                 <p:cNvPr id="186" name="Forme libre : forme 185">
                   <a:extLst>
                     <a:ext uri="{FF2B5EF4-FFF2-40B4-BE49-F238E27FC236}">
-                      <a16:creationId xmlns:a16="http://schemas.microsoft.com/office/drawing/2014/main" id="{72A15036-64F3-45CE-B769-F91421F674CB}"/>
+                      <a16:creationId xmlns:a16="http://schemas.microsoft.com/office/drawing/2014/main" xmlns="" id="{72A15036-64F3-45CE-B769-F91421F674CB}"/>
                     </a:ext>
                   </a:extLst>
                 </p:cNvPr>
@@ -11826,7 +11826,7 @@
                 <p:cNvPr id="187" name="Connecteur droit avec flèche 186">
                   <a:extLst>
                     <a:ext uri="{FF2B5EF4-FFF2-40B4-BE49-F238E27FC236}">
-                      <a16:creationId xmlns:a16="http://schemas.microsoft.com/office/drawing/2014/main" id="{DD47E5A7-7597-4C5B-B3B6-A805B81A3DD0}"/>
+                      <a16:creationId xmlns:a16="http://schemas.microsoft.com/office/drawing/2014/main" xmlns="" id="{DD47E5A7-7597-4C5B-B3B6-A805B81A3DD0}"/>
                     </a:ext>
                   </a:extLst>
                 </p:cNvPr>
@@ -11869,7 +11869,7 @@
             <p:cNvPr id="159" name="Groupe 158">
               <a:extLst>
                 <a:ext uri="{FF2B5EF4-FFF2-40B4-BE49-F238E27FC236}">
-                  <a16:creationId xmlns:a16="http://schemas.microsoft.com/office/drawing/2014/main" id="{4538E65F-B63A-484B-926B-1CE5A819DAFE}"/>
+                  <a16:creationId xmlns:a16="http://schemas.microsoft.com/office/drawing/2014/main" xmlns="" id="{4538E65F-B63A-484B-926B-1CE5A819DAFE}"/>
                 </a:ext>
               </a:extLst>
             </p:cNvPr>
@@ -11889,7 +11889,7 @@
               <p:cNvPr id="161" name="Groupe 160">
                 <a:extLst>
                   <a:ext uri="{FF2B5EF4-FFF2-40B4-BE49-F238E27FC236}">
-                    <a16:creationId xmlns:a16="http://schemas.microsoft.com/office/drawing/2014/main" id="{2756D4B9-D8E6-436E-B0AB-610F5C8E9656}"/>
+                    <a16:creationId xmlns:a16="http://schemas.microsoft.com/office/drawing/2014/main" xmlns="" id="{2756D4B9-D8E6-436E-B0AB-610F5C8E9656}"/>
                   </a:ext>
                 </a:extLst>
               </p:cNvPr>
@@ -11911,7 +11911,7 @@
                     <p:cNvPr id="166" name="ZoneTexte 165">
                       <a:extLst>
                         <a:ext uri="{FF2B5EF4-FFF2-40B4-BE49-F238E27FC236}">
-                          <a16:creationId xmlns:a16="http://schemas.microsoft.com/office/drawing/2014/main" id="{C32DCCCB-5F59-42EB-A69D-5B28B9A52AE5}"/>
+                          <a16:creationId xmlns:a16="http://schemas.microsoft.com/office/drawing/2014/main" xmlns="" id="{C32DCCCB-5F59-42EB-A69D-5B28B9A52AE5}"/>
                         </a:ext>
                       </a:extLst>
                     </p:cNvPr>
@@ -12054,7 +12054,7 @@
                     <p:cNvPr id="167" name="ZoneTexte 166">
                       <a:extLst>
                         <a:ext uri="{FF2B5EF4-FFF2-40B4-BE49-F238E27FC236}">
-                          <a16:creationId xmlns:a16="http://schemas.microsoft.com/office/drawing/2014/main" id="{0F472BF4-3DAE-471F-88B2-BBB033733303}"/>
+                          <a16:creationId xmlns:a16="http://schemas.microsoft.com/office/drawing/2014/main" xmlns="" id="{0F472BF4-3DAE-471F-88B2-BBB033733303}"/>
                         </a:ext>
                       </a:extLst>
                     </p:cNvPr>
@@ -12192,7 +12192,7 @@
                     <p:cNvPr id="168" name="ZoneTexte 167">
                       <a:extLst>
                         <a:ext uri="{FF2B5EF4-FFF2-40B4-BE49-F238E27FC236}">
-                          <a16:creationId xmlns:a16="http://schemas.microsoft.com/office/drawing/2014/main" id="{E20C3480-C1C5-4594-B95A-EF6B36AD5621}"/>
+                          <a16:creationId xmlns:a16="http://schemas.microsoft.com/office/drawing/2014/main" xmlns="" id="{E20C3480-C1C5-4594-B95A-EF6B36AD5621}"/>
                         </a:ext>
                       </a:extLst>
                     </p:cNvPr>
@@ -12330,7 +12330,7 @@
                     <p:cNvPr id="169" name="ZoneTexte 168">
                       <a:extLst>
                         <a:ext uri="{FF2B5EF4-FFF2-40B4-BE49-F238E27FC236}">
-                          <a16:creationId xmlns:a16="http://schemas.microsoft.com/office/drawing/2014/main" id="{4953892F-BCF8-41FB-80DF-C48D561D9A9F}"/>
+                          <a16:creationId xmlns:a16="http://schemas.microsoft.com/office/drawing/2014/main" xmlns="" id="{4953892F-BCF8-41FB-80DF-C48D561D9A9F}"/>
                         </a:ext>
                       </a:extLst>
                     </p:cNvPr>
@@ -12466,7 +12466,7 @@
                 <p:cNvPr id="170" name="Groupe 169">
                   <a:extLst>
                     <a:ext uri="{FF2B5EF4-FFF2-40B4-BE49-F238E27FC236}">
-                      <a16:creationId xmlns:a16="http://schemas.microsoft.com/office/drawing/2014/main" id="{E7F83AE6-5BD5-4342-9009-696C4D316D3A}"/>
+                      <a16:creationId xmlns:a16="http://schemas.microsoft.com/office/drawing/2014/main" xmlns="" id="{E7F83AE6-5BD5-4342-9009-696C4D316D3A}"/>
                     </a:ext>
                   </a:extLst>
                 </p:cNvPr>
@@ -12486,7 +12486,7 @@
                   <p:cNvPr id="174" name="Forme libre : forme 173">
                     <a:extLst>
                       <a:ext uri="{FF2B5EF4-FFF2-40B4-BE49-F238E27FC236}">
-                        <a16:creationId xmlns:a16="http://schemas.microsoft.com/office/drawing/2014/main" id="{9251C838-501F-49F1-9C0E-0C83F948AE3E}"/>
+                        <a16:creationId xmlns:a16="http://schemas.microsoft.com/office/drawing/2014/main" xmlns="" id="{9251C838-501F-49F1-9C0E-0C83F948AE3E}"/>
                       </a:ext>
                     </a:extLst>
                   </p:cNvPr>
@@ -12571,7 +12571,7 @@
                   <p:cNvPr id="175" name="Connecteur droit avec flèche 174">
                     <a:extLst>
                       <a:ext uri="{FF2B5EF4-FFF2-40B4-BE49-F238E27FC236}">
-                        <a16:creationId xmlns:a16="http://schemas.microsoft.com/office/drawing/2014/main" id="{BF7D50FB-0C04-4A02-8E71-C5F9A0F08757}"/>
+                        <a16:creationId xmlns:a16="http://schemas.microsoft.com/office/drawing/2014/main" xmlns="" id="{BF7D50FB-0C04-4A02-8E71-C5F9A0F08757}"/>
                       </a:ext>
                     </a:extLst>
                   </p:cNvPr>
@@ -12613,7 +12613,7 @@
                 <p:cNvPr id="171" name="Groupe 170">
                   <a:extLst>
                     <a:ext uri="{FF2B5EF4-FFF2-40B4-BE49-F238E27FC236}">
-                      <a16:creationId xmlns:a16="http://schemas.microsoft.com/office/drawing/2014/main" id="{83D7DD17-5CAC-49A6-85C9-35D62C2C1105}"/>
+                      <a16:creationId xmlns:a16="http://schemas.microsoft.com/office/drawing/2014/main" xmlns="" id="{83D7DD17-5CAC-49A6-85C9-35D62C2C1105}"/>
                     </a:ext>
                   </a:extLst>
                 </p:cNvPr>
@@ -12633,7 +12633,7 @@
                   <p:cNvPr id="172" name="Forme libre : forme 171">
                     <a:extLst>
                       <a:ext uri="{FF2B5EF4-FFF2-40B4-BE49-F238E27FC236}">
-                        <a16:creationId xmlns:a16="http://schemas.microsoft.com/office/drawing/2014/main" id="{C8424DE6-D08B-497E-8DA6-308CCFE235D5}"/>
+                        <a16:creationId xmlns:a16="http://schemas.microsoft.com/office/drawing/2014/main" xmlns="" id="{C8424DE6-D08B-497E-8DA6-308CCFE235D5}"/>
                       </a:ext>
                     </a:extLst>
                   </p:cNvPr>
@@ -12718,7 +12718,7 @@
                   <p:cNvPr id="173" name="Connecteur droit avec flèche 172">
                     <a:extLst>
                       <a:ext uri="{FF2B5EF4-FFF2-40B4-BE49-F238E27FC236}">
-                        <a16:creationId xmlns:a16="http://schemas.microsoft.com/office/drawing/2014/main" id="{3E8E257B-6266-46AD-842D-15989865D0EB}"/>
+                        <a16:creationId xmlns:a16="http://schemas.microsoft.com/office/drawing/2014/main" xmlns="" id="{3E8E257B-6266-46AD-842D-15989865D0EB}"/>
                       </a:ext>
                     </a:extLst>
                   </p:cNvPr>
@@ -12761,7 +12761,7 @@
               <p:cNvPr id="162" name="Forme libre : forme 161">
                 <a:extLst>
                   <a:ext uri="{FF2B5EF4-FFF2-40B4-BE49-F238E27FC236}">
-                    <a16:creationId xmlns:a16="http://schemas.microsoft.com/office/drawing/2014/main" id="{30668CA9-F2F4-4A2B-9394-08641E0BA546}"/>
+                    <a16:creationId xmlns:a16="http://schemas.microsoft.com/office/drawing/2014/main" xmlns="" id="{30668CA9-F2F4-4A2B-9394-08641E0BA546}"/>
                   </a:ext>
                 </a:extLst>
               </p:cNvPr>
@@ -12856,7 +12856,7 @@
               <p:cNvPr id="163" name="Forme libre : forme 162">
                 <a:extLst>
                   <a:ext uri="{FF2B5EF4-FFF2-40B4-BE49-F238E27FC236}">
-                    <a16:creationId xmlns:a16="http://schemas.microsoft.com/office/drawing/2014/main" id="{AE0E81DF-4614-41D5-B237-232A0A566967}"/>
+                    <a16:creationId xmlns:a16="http://schemas.microsoft.com/office/drawing/2014/main" xmlns="" id="{AE0E81DF-4614-41D5-B237-232A0A566967}"/>
                   </a:ext>
                 </a:extLst>
               </p:cNvPr>
@@ -12951,7 +12951,7 @@
               <p:cNvPr id="164" name="Connecteur droit avec flèche 163">
                 <a:extLst>
                   <a:ext uri="{FF2B5EF4-FFF2-40B4-BE49-F238E27FC236}">
-                    <a16:creationId xmlns:a16="http://schemas.microsoft.com/office/drawing/2014/main" id="{937ED5AF-4EA9-40DB-A035-A72B4BE7EE34}"/>
+                    <a16:creationId xmlns:a16="http://schemas.microsoft.com/office/drawing/2014/main" xmlns="" id="{937ED5AF-4EA9-40DB-A035-A72B4BE7EE34}"/>
                   </a:ext>
                 </a:extLst>
               </p:cNvPr>
@@ -12992,7 +12992,7 @@
               <p:cNvPr id="165" name="Connecteur droit avec flèche 164">
                 <a:extLst>
                   <a:ext uri="{FF2B5EF4-FFF2-40B4-BE49-F238E27FC236}">
-                    <a16:creationId xmlns:a16="http://schemas.microsoft.com/office/drawing/2014/main" id="{533D58FE-360A-4403-BA95-1D2459299835}"/>
+                    <a16:creationId xmlns:a16="http://schemas.microsoft.com/office/drawing/2014/main" xmlns="" id="{533D58FE-360A-4403-BA95-1D2459299835}"/>
                   </a:ext>
                 </a:extLst>
               </p:cNvPr>
@@ -13034,7 +13034,7 @@
                 <p:cNvPr id="160" name="ZoneTexte 159">
                   <a:extLst>
                     <a:ext uri="{FF2B5EF4-FFF2-40B4-BE49-F238E27FC236}">
-                      <a16:creationId xmlns:a16="http://schemas.microsoft.com/office/drawing/2014/main" id="{957E7A5C-FACA-49FD-8C3C-A073729D5E2E}"/>
+                      <a16:creationId xmlns:a16="http://schemas.microsoft.com/office/drawing/2014/main" xmlns="" id="{957E7A5C-FACA-49FD-8C3C-A073729D5E2E}"/>
                     </a:ext>
                   </a:extLst>
                 </p:cNvPr>

</xml_diff>